<commit_message>
some updates for clarity
</commit_message>
<xml_diff>
--- a/Session08/Session8_Slides.pptx
+++ b/Session08/Session8_Slides.pptx
@@ -6,42 +6,41 @@
     <p:sldMasterId id="2147483648" r:id="rId2"/>
   </p:sldMasterIdLst>
   <p:notesMasterIdLst>
-    <p:notesMasterId r:id="rId36"/>
+    <p:notesMasterId r:id="rId35"/>
   </p:notesMasterIdLst>
   <p:sldIdLst>
     <p:sldId id="256" r:id="rId3"/>
     <p:sldId id="274" r:id="rId4"/>
-    <p:sldId id="275" r:id="rId5"/>
-    <p:sldId id="276" r:id="rId6"/>
-    <p:sldId id="277" r:id="rId7"/>
-    <p:sldId id="278" r:id="rId8"/>
-    <p:sldId id="279" r:id="rId9"/>
-    <p:sldId id="280" r:id="rId10"/>
-    <p:sldId id="281" r:id="rId11"/>
-    <p:sldId id="282" r:id="rId12"/>
-    <p:sldId id="283" r:id="rId13"/>
-    <p:sldId id="287" r:id="rId14"/>
-    <p:sldId id="289" r:id="rId15"/>
-    <p:sldId id="290" r:id="rId16"/>
-    <p:sldId id="291" r:id="rId17"/>
-    <p:sldId id="292" r:id="rId18"/>
-    <p:sldId id="293" r:id="rId19"/>
-    <p:sldId id="294" r:id="rId20"/>
-    <p:sldId id="295" r:id="rId21"/>
-    <p:sldId id="320" r:id="rId22"/>
-    <p:sldId id="321" r:id="rId23"/>
-    <p:sldId id="322" r:id="rId24"/>
-    <p:sldId id="323" r:id="rId25"/>
-    <p:sldId id="324" r:id="rId26"/>
-    <p:sldId id="332" r:id="rId27"/>
-    <p:sldId id="325" r:id="rId28"/>
-    <p:sldId id="330" r:id="rId29"/>
-    <p:sldId id="331" r:id="rId30"/>
-    <p:sldId id="326" r:id="rId31"/>
-    <p:sldId id="327" r:id="rId32"/>
-    <p:sldId id="328" r:id="rId33"/>
-    <p:sldId id="329" r:id="rId34"/>
-    <p:sldId id="319" r:id="rId35"/>
+    <p:sldId id="276" r:id="rId5"/>
+    <p:sldId id="277" r:id="rId6"/>
+    <p:sldId id="278" r:id="rId7"/>
+    <p:sldId id="279" r:id="rId8"/>
+    <p:sldId id="280" r:id="rId9"/>
+    <p:sldId id="281" r:id="rId10"/>
+    <p:sldId id="282" r:id="rId11"/>
+    <p:sldId id="283" r:id="rId12"/>
+    <p:sldId id="287" r:id="rId13"/>
+    <p:sldId id="289" r:id="rId14"/>
+    <p:sldId id="290" r:id="rId15"/>
+    <p:sldId id="291" r:id="rId16"/>
+    <p:sldId id="292" r:id="rId17"/>
+    <p:sldId id="293" r:id="rId18"/>
+    <p:sldId id="294" r:id="rId19"/>
+    <p:sldId id="295" r:id="rId20"/>
+    <p:sldId id="320" r:id="rId21"/>
+    <p:sldId id="321" r:id="rId22"/>
+    <p:sldId id="322" r:id="rId23"/>
+    <p:sldId id="323" r:id="rId24"/>
+    <p:sldId id="324" r:id="rId25"/>
+    <p:sldId id="332" r:id="rId26"/>
+    <p:sldId id="325" r:id="rId27"/>
+    <p:sldId id="330" r:id="rId28"/>
+    <p:sldId id="331" r:id="rId29"/>
+    <p:sldId id="326" r:id="rId30"/>
+    <p:sldId id="327" r:id="rId31"/>
+    <p:sldId id="328" r:id="rId32"/>
+    <p:sldId id="329" r:id="rId33"/>
+    <p:sldId id="319" r:id="rId34"/>
   </p:sldIdLst>
   <p:sldSz cx="13004800" cy="9753600"/>
   <p:notesSz cx="6858000" cy="9144000"/>
@@ -9111,7 +9110,7 @@
           </a:ln>
           <a:extLst>
             <a:ext uri="{C572A759-6A51-4108-AA02-DFA0A04FC94B}">
-              <ma14:wrappingTextBoxFlag xmlns:ma14="http://schemas.microsoft.com/office/mac/drawingml/2011/main" xmlns="" val="1"/>
+              <ma14:wrappingTextBoxFlag xmlns="" xmlns:ma14="http://schemas.microsoft.com/office/mac/drawingml/2011/main" val="1"/>
             </a:ext>
           </a:extLst>
         </p:spPr>
@@ -9150,7 +9149,7 @@
           </a:ln>
           <a:extLst>
             <a:ext uri="{C572A759-6A51-4108-AA02-DFA0A04FC94B}">
-              <ma14:wrappingTextBoxFlag xmlns:ma14="http://schemas.microsoft.com/office/mac/drawingml/2011/main" xmlns="" val="1"/>
+              <ma14:wrappingTextBoxFlag xmlns="" xmlns:ma14="http://schemas.microsoft.com/office/mac/drawingml/2011/main" val="1"/>
             </a:ext>
           </a:extLst>
         </p:spPr>
@@ -10221,7 +10220,7 @@
           </a:ln>
           <a:extLst>
             <a:ext uri="{C572A759-6A51-4108-AA02-DFA0A04FC94B}">
-              <ma14:wrappingTextBoxFlag xmlns:ma14="http://schemas.microsoft.com/office/mac/drawingml/2011/main" xmlns="" val="1"/>
+              <ma14:wrappingTextBoxFlag xmlns="" xmlns:ma14="http://schemas.microsoft.com/office/mac/drawingml/2011/main" val="1"/>
             </a:ext>
           </a:extLst>
         </p:spPr>
@@ -10260,7 +10259,7 @@
           </a:ln>
           <a:extLst>
             <a:ext uri="{C572A759-6A51-4108-AA02-DFA0A04FC94B}">
-              <ma14:wrappingTextBoxFlag xmlns:ma14="http://schemas.microsoft.com/office/mac/drawingml/2011/main" xmlns="" val="1"/>
+              <ma14:wrappingTextBoxFlag xmlns="" xmlns:ma14="http://schemas.microsoft.com/office/mac/drawingml/2011/main" val="1"/>
             </a:ext>
           </a:extLst>
         </p:spPr>
@@ -11297,112 +11296,6 @@
       </p:grpSpPr>
       <p:sp>
         <p:nvSpPr>
-          <p:cNvPr id="281" name="Shape 281"/>
-          <p:cNvSpPr>
-            <a:spLocks noGrp="1"/>
-          </p:cNvSpPr>
-          <p:nvPr>
-            <p:ph type="title"/>
-          </p:nvPr>
-        </p:nvSpPr>
-        <p:spPr>
-          <a:xfrm>
-            <a:off x="406400" y="1536700"/>
-            <a:ext cx="12192000" cy="1169260"/>
-          </a:xfrm>
-          <a:prstGeom prst="rect">
-            <a:avLst/>
-          </a:prstGeom>
-        </p:spPr>
-        <p:txBody>
-          <a:bodyPr/>
-          <a:lstStyle>
-            <a:lvl1pPr defTabSz="403097">
-              <a:spcBef>
-                <a:spcPts val="1900"/>
-              </a:spcBef>
-              <a:defRPr sz="8280"/>
-            </a:lvl1pPr>
-          </a:lstStyle>
-          <a:p>
-            <a:r>
-              <a:t>Correlation</a:t>
-            </a:r>
-          </a:p>
-        </p:txBody>
-      </p:sp>
-      <p:sp>
-        <p:nvSpPr>
-          <p:cNvPr id="282" name="Shape 282"/>
-          <p:cNvSpPr/>
-          <p:nvPr/>
-        </p:nvSpPr>
-        <p:spPr>
-          <a:xfrm>
-            <a:off x="763759" y="4925950"/>
-            <a:ext cx="4482034" cy="1168401"/>
-          </a:xfrm>
-          <a:prstGeom prst="rect">
-            <a:avLst/>
-          </a:prstGeom>
-          <a:ln w="12700">
-            <a:miter lim="400000"/>
-          </a:ln>
-          <a:extLst>
-            <a:ext uri="{C572A759-6A51-4108-AA02-DFA0A04FC94B}">
-              <ma14:wrappingTextBoxFlag xmlns:ma14="http://schemas.microsoft.com/office/mac/drawingml/2011/main" xmlns="" val="1"/>
-            </a:ext>
-          </a:extLst>
-        </p:spPr>
-        <p:txBody>
-          <a:bodyPr wrap="none" lIns="50800" tIns="50800" rIns="50800" bIns="50800" anchor="ctr">
-            <a:spAutoFit/>
-          </a:bodyPr>
-          <a:lstStyle>
-            <a:lvl1pPr>
-              <a:defRPr sz="7000">
-                <a:latin typeface="Anonymous Pro for Powerline"/>
-                <a:ea typeface="Anonymous Pro for Powerline"/>
-                <a:cs typeface="Anonymous Pro for Powerline"/>
-                <a:sym typeface="Anonymous Pro for Powerline"/>
-              </a:defRPr>
-            </a:lvl1pPr>
-          </a:lstStyle>
-          <a:p>
-            <a:r>
-              <a:t>df.corr()</a:t>
-            </a:r>
-          </a:p>
-        </p:txBody>
-      </p:sp>
-    </p:spTree>
-  </p:cSld>
-  <p:clrMapOvr>
-    <a:masterClrMapping/>
-  </p:clrMapOvr>
-  <p:transition spd="med"/>
-</p:sld>
-</file>
-
-<file path=ppt/slides/slide11.xml><?xml version="1.0" encoding="utf-8"?>
-<p:sld xmlns:a="http://schemas.openxmlformats.org/drawingml/2006/main" xmlns:r="http://schemas.openxmlformats.org/officeDocument/2006/relationships" xmlns:p="http://schemas.openxmlformats.org/presentationml/2006/main">
-  <p:cSld>
-    <p:spTree>
-      <p:nvGrpSpPr>
-        <p:cNvPr id="1" name=""/>
-        <p:cNvGrpSpPr/>
-        <p:nvPr/>
-      </p:nvGrpSpPr>
-      <p:grpSpPr>
-        <a:xfrm>
-          <a:off x="0" y="0"/>
-          <a:ext cx="0" cy="0"/>
-          <a:chOff x="0" y="0"/>
-          <a:chExt cx="0" cy="0"/>
-        </a:xfrm>
-      </p:grpSpPr>
-      <p:sp>
-        <p:nvSpPr>
           <p:cNvPr id="284" name="Shape 284"/>
           <p:cNvSpPr>
             <a:spLocks noGrp="1"/>
@@ -11473,7 +11366,7 @@
 </p:sld>
 </file>
 
-<file path=ppt/slides/slide12.xml><?xml version="1.0" encoding="utf-8"?>
+<file path=ppt/slides/slide11.xml><?xml version="1.0" encoding="utf-8"?>
 <p:sld xmlns:a="http://schemas.openxmlformats.org/drawingml/2006/main" xmlns:r="http://schemas.openxmlformats.org/officeDocument/2006/relationships" xmlns:p="http://schemas.openxmlformats.org/presentationml/2006/main">
   <p:cSld>
     <p:spTree>
@@ -11545,7 +11438,7 @@
           </a:ln>
           <a:extLst>
             <a:ext uri="{C572A759-6A51-4108-AA02-DFA0A04FC94B}">
-              <ma14:wrappingTextBoxFlag xmlns:ma14="http://schemas.microsoft.com/office/mac/drawingml/2011/main" xmlns="" val="1"/>
+              <ma14:wrappingTextBoxFlag xmlns="" xmlns:ma14="http://schemas.microsoft.com/office/mac/drawingml/2011/main" val="1"/>
             </a:ext>
           </a:extLst>
         </p:spPr>
@@ -11579,7 +11472,7 @@
 </p:sld>
 </file>
 
-<file path=ppt/slides/slide13.xml><?xml version="1.0" encoding="utf-8"?>
+<file path=ppt/slides/slide12.xml><?xml version="1.0" encoding="utf-8"?>
 <p:sld xmlns:a="http://schemas.openxmlformats.org/drawingml/2006/main" xmlns:r="http://schemas.openxmlformats.org/officeDocument/2006/relationships" xmlns:p="http://schemas.openxmlformats.org/presentationml/2006/main">
   <p:cSld>
     <p:spTree>
@@ -11655,7 +11548,7 @@
 </p:sld>
 </file>
 
-<file path=ppt/slides/slide14.xml><?xml version="1.0" encoding="utf-8"?>
+<file path=ppt/slides/slide13.xml><?xml version="1.0" encoding="utf-8"?>
 <p:sld xmlns:a="http://schemas.openxmlformats.org/drawingml/2006/main" xmlns:r="http://schemas.openxmlformats.org/officeDocument/2006/relationships" xmlns:p="http://schemas.openxmlformats.org/presentationml/2006/main">
   <p:cSld>
     <p:spTree>
@@ -11704,7 +11597,7 @@
 </p:sld>
 </file>
 
-<file path=ppt/slides/slide15.xml><?xml version="1.0" encoding="utf-8"?>
+<file path=ppt/slides/slide14.xml><?xml version="1.0" encoding="utf-8"?>
 <p:sld xmlns:a="http://schemas.openxmlformats.org/drawingml/2006/main" xmlns:r="http://schemas.openxmlformats.org/officeDocument/2006/relationships" xmlns:p="http://schemas.openxmlformats.org/presentationml/2006/main">
   <p:cSld>
     <p:spTree>
@@ -11753,7 +11646,7 @@
 </p:sld>
 </file>
 
-<file path=ppt/slides/slide16.xml><?xml version="1.0" encoding="utf-8"?>
+<file path=ppt/slides/slide15.xml><?xml version="1.0" encoding="utf-8"?>
 <p:sld xmlns:a="http://schemas.openxmlformats.org/drawingml/2006/main" xmlns:r="http://schemas.openxmlformats.org/officeDocument/2006/relationships" xmlns:p="http://schemas.openxmlformats.org/presentationml/2006/main">
   <p:cSld>
     <p:bg>
@@ -11814,7 +11707,7 @@
 </p:sld>
 </file>
 
-<file path=ppt/slides/slide17.xml><?xml version="1.0" encoding="utf-8"?>
+<file path=ppt/slides/slide16.xml><?xml version="1.0" encoding="utf-8"?>
 <p:sld xmlns:a="http://schemas.openxmlformats.org/drawingml/2006/main" xmlns:r="http://schemas.openxmlformats.org/officeDocument/2006/relationships" xmlns:p="http://schemas.openxmlformats.org/presentationml/2006/main">
   <p:cSld>
     <p:bg>
@@ -11875,7 +11768,7 @@
 </p:sld>
 </file>
 
-<file path=ppt/slides/slide18.xml><?xml version="1.0" encoding="utf-8"?>
+<file path=ppt/slides/slide17.xml><?xml version="1.0" encoding="utf-8"?>
 <p:sld xmlns:a="http://schemas.openxmlformats.org/drawingml/2006/main" xmlns:r="http://schemas.openxmlformats.org/officeDocument/2006/relationships" xmlns:p="http://schemas.openxmlformats.org/presentationml/2006/main">
   <p:cSld>
     <p:spTree>
@@ -11931,7 +11824,7 @@
 </p:sld>
 </file>
 
-<file path=ppt/slides/slide19.xml><?xml version="1.0" encoding="utf-8"?>
+<file path=ppt/slides/slide18.xml><?xml version="1.0" encoding="utf-8"?>
 <p:sld xmlns:a="http://schemas.openxmlformats.org/drawingml/2006/main" xmlns:r="http://schemas.openxmlformats.org/officeDocument/2006/relationships" xmlns:p="http://schemas.openxmlformats.org/presentationml/2006/main">
   <p:cSld>
     <p:spTree>
@@ -12136,156 +12029,7 @@
 </p:sld>
 </file>
 
-<file path=ppt/slides/slide2.xml><?xml version="1.0" encoding="utf-8"?>
-<p:sld xmlns:a="http://schemas.openxmlformats.org/drawingml/2006/main" xmlns:r="http://schemas.openxmlformats.org/officeDocument/2006/relationships" xmlns:p="http://schemas.openxmlformats.org/presentationml/2006/main">
-  <p:cSld>
-    <p:spTree>
-      <p:nvGrpSpPr>
-        <p:cNvPr id="1" name=""/>
-        <p:cNvGrpSpPr/>
-        <p:nvPr/>
-      </p:nvGrpSpPr>
-      <p:grpSpPr>
-        <a:xfrm>
-          <a:off x="0" y="0"/>
-          <a:ext cx="0" cy="0"/>
-          <a:chOff x="0" y="0"/>
-          <a:chExt cx="0" cy="0"/>
-        </a:xfrm>
-      </p:grpSpPr>
-      <p:sp>
-        <p:nvSpPr>
-          <p:cNvPr id="256" name="Shape 256"/>
-          <p:cNvSpPr>
-            <a:spLocks noGrp="1"/>
-          </p:cNvSpPr>
-          <p:nvPr>
-            <p:ph type="title"/>
-          </p:nvPr>
-        </p:nvSpPr>
-        <p:spPr>
-          <a:xfrm>
-            <a:off x="406400" y="1536700"/>
-            <a:ext cx="12192000" cy="1169260"/>
-          </a:xfrm>
-          <a:prstGeom prst="rect">
-            <a:avLst/>
-          </a:prstGeom>
-        </p:spPr>
-        <p:txBody>
-          <a:bodyPr>
-            <a:normAutofit fontScale="90000"/>
-          </a:bodyPr>
-          <a:lstStyle>
-            <a:lvl1pPr defTabSz="403097">
-              <a:spcBef>
-                <a:spcPts val="1900"/>
-              </a:spcBef>
-              <a:defRPr sz="8280"/>
-            </a:lvl1pPr>
-          </a:lstStyle>
-          <a:p>
-            <a:r>
-              <a:t>Importing time series data</a:t>
-            </a:r>
-          </a:p>
-        </p:txBody>
-      </p:sp>
-      <p:sp>
-        <p:nvSpPr>
-          <p:cNvPr id="257" name="Shape 257"/>
-          <p:cNvSpPr/>
-          <p:nvPr/>
-        </p:nvSpPr>
-        <p:spPr>
-          <a:xfrm>
-            <a:off x="756622" y="4119170"/>
-            <a:ext cx="11785046" cy="3035301"/>
-          </a:xfrm>
-          <a:prstGeom prst="rect">
-            <a:avLst/>
-          </a:prstGeom>
-          <a:ln w="12700">
-            <a:miter lim="400000"/>
-          </a:ln>
-          <a:extLst>
-            <a:ext uri="{C572A759-6A51-4108-AA02-DFA0A04FC94B}">
-              <ma14:wrappingTextBoxFlag xmlns:ma14="http://schemas.microsoft.com/office/mac/drawingml/2011/main" xmlns="" val="1"/>
-            </a:ext>
-          </a:extLst>
-        </p:spPr>
-        <p:txBody>
-          <a:bodyPr lIns="50800" tIns="50800" rIns="50800" bIns="50800" anchor="ctr">
-            <a:spAutoFit/>
-          </a:bodyPr>
-          <a:lstStyle/>
-          <a:p>
-            <a:pPr>
-              <a:defRPr sz="5100">
-                <a:latin typeface="Anonymous Pro for Powerline"/>
-                <a:ea typeface="Anonymous Pro for Powerline"/>
-                <a:cs typeface="Anonymous Pro for Powerline"/>
-                <a:sym typeface="Anonymous Pro for Powerline"/>
-              </a:defRPr>
-            </a:pPr>
-            <a:r>
-              <a:t>pd.read_csv(‘path.csv',</a:t>
-            </a:r>
-          </a:p>
-          <a:p>
-            <a:pPr>
-              <a:defRPr sz="5100">
-                <a:latin typeface="Anonymous Pro for Powerline"/>
-                <a:ea typeface="Anonymous Pro for Powerline"/>
-                <a:cs typeface="Anonymous Pro for Powerline"/>
-                <a:sym typeface="Anonymous Pro for Powerline"/>
-              </a:defRPr>
-            </a:pPr>
-            <a:r>
-              <a:t>            </a:t>
-            </a:r>
-            <a:r>
-              <a:rPr>
-                <a:solidFill>
-                  <a:schemeClr val="accent3"/>
-                </a:solidFill>
-              </a:rPr>
-              <a:t>parse_dates=[‘Date'],</a:t>
-            </a:r>
-          </a:p>
-          <a:p>
-            <a:pPr>
-              <a:defRPr sz="5100">
-                <a:latin typeface="Anonymous Pro for Powerline"/>
-                <a:ea typeface="Anonymous Pro for Powerline"/>
-                <a:cs typeface="Anonymous Pro for Powerline"/>
-                <a:sym typeface="Anonymous Pro for Powerline"/>
-              </a:defRPr>
-            </a:pPr>
-            <a:r>
-              <a:rPr>
-                <a:solidFill>
-                  <a:schemeClr val="accent3"/>
-                </a:solidFill>
-              </a:rPr>
-              <a:t>            index_col='Date'</a:t>
-            </a:r>
-            <a:r>
-              <a:t>)</a:t>
-            </a:r>
-          </a:p>
-        </p:txBody>
-      </p:sp>
-    </p:spTree>
-  </p:cSld>
-  <p:clrMapOvr>
-    <a:masterClrMapping/>
-  </p:clrMapOvr>
-  <p:transition spd="med"/>
-</p:sld>
-</file>
-
-<file path=ppt/slides/slide20.xml><?xml version="1.0" encoding="utf-8"?>
+<file path=ppt/slides/slide19.xml><?xml version="1.0" encoding="utf-8"?>
 <p:sld xmlns:a="http://schemas.openxmlformats.org/drawingml/2006/main" xmlns:r="http://schemas.openxmlformats.org/officeDocument/2006/relationships" xmlns:p="http://schemas.openxmlformats.org/presentationml/2006/main">
   <p:cSld>
     <p:spTree>
@@ -12591,7 +12335,156 @@
 </p:sld>
 </file>
 
-<file path=ppt/slides/slide21.xml><?xml version="1.0" encoding="utf-8"?>
+<file path=ppt/slides/slide2.xml><?xml version="1.0" encoding="utf-8"?>
+<p:sld xmlns:a="http://schemas.openxmlformats.org/drawingml/2006/main" xmlns:r="http://schemas.openxmlformats.org/officeDocument/2006/relationships" xmlns:p="http://schemas.openxmlformats.org/presentationml/2006/main">
+  <p:cSld>
+    <p:spTree>
+      <p:nvGrpSpPr>
+        <p:cNvPr id="1" name=""/>
+        <p:cNvGrpSpPr/>
+        <p:nvPr/>
+      </p:nvGrpSpPr>
+      <p:grpSpPr>
+        <a:xfrm>
+          <a:off x="0" y="0"/>
+          <a:ext cx="0" cy="0"/>
+          <a:chOff x="0" y="0"/>
+          <a:chExt cx="0" cy="0"/>
+        </a:xfrm>
+      </p:grpSpPr>
+      <p:sp>
+        <p:nvSpPr>
+          <p:cNvPr id="256" name="Shape 256"/>
+          <p:cNvSpPr>
+            <a:spLocks noGrp="1"/>
+          </p:cNvSpPr>
+          <p:nvPr>
+            <p:ph type="title"/>
+          </p:nvPr>
+        </p:nvSpPr>
+        <p:spPr>
+          <a:xfrm>
+            <a:off x="406400" y="1536700"/>
+            <a:ext cx="12192000" cy="1169260"/>
+          </a:xfrm>
+          <a:prstGeom prst="rect">
+            <a:avLst/>
+          </a:prstGeom>
+        </p:spPr>
+        <p:txBody>
+          <a:bodyPr>
+            <a:normAutofit fontScale="90000"/>
+          </a:bodyPr>
+          <a:lstStyle>
+            <a:lvl1pPr defTabSz="403097">
+              <a:spcBef>
+                <a:spcPts val="1900"/>
+              </a:spcBef>
+              <a:defRPr sz="8280"/>
+            </a:lvl1pPr>
+          </a:lstStyle>
+          <a:p>
+            <a:r>
+              <a:t>Importing time series data</a:t>
+            </a:r>
+          </a:p>
+        </p:txBody>
+      </p:sp>
+      <p:sp>
+        <p:nvSpPr>
+          <p:cNvPr id="257" name="Shape 257"/>
+          <p:cNvSpPr/>
+          <p:nvPr/>
+        </p:nvSpPr>
+        <p:spPr>
+          <a:xfrm>
+            <a:off x="756622" y="4119170"/>
+            <a:ext cx="11785046" cy="3035301"/>
+          </a:xfrm>
+          <a:prstGeom prst="rect">
+            <a:avLst/>
+          </a:prstGeom>
+          <a:ln w="12700">
+            <a:miter lim="400000"/>
+          </a:ln>
+          <a:extLst>
+            <a:ext uri="{C572A759-6A51-4108-AA02-DFA0A04FC94B}">
+              <ma14:wrappingTextBoxFlag xmlns="" xmlns:ma14="http://schemas.microsoft.com/office/mac/drawingml/2011/main" val="1"/>
+            </a:ext>
+          </a:extLst>
+        </p:spPr>
+        <p:txBody>
+          <a:bodyPr lIns="50800" tIns="50800" rIns="50800" bIns="50800" anchor="ctr">
+            <a:spAutoFit/>
+          </a:bodyPr>
+          <a:lstStyle/>
+          <a:p>
+            <a:pPr>
+              <a:defRPr sz="5100">
+                <a:latin typeface="Anonymous Pro for Powerline"/>
+                <a:ea typeface="Anonymous Pro for Powerline"/>
+                <a:cs typeface="Anonymous Pro for Powerline"/>
+                <a:sym typeface="Anonymous Pro for Powerline"/>
+              </a:defRPr>
+            </a:pPr>
+            <a:r>
+              <a:t>pd.read_csv(‘path.csv',</a:t>
+            </a:r>
+          </a:p>
+          <a:p>
+            <a:pPr>
+              <a:defRPr sz="5100">
+                <a:latin typeface="Anonymous Pro for Powerline"/>
+                <a:ea typeface="Anonymous Pro for Powerline"/>
+                <a:cs typeface="Anonymous Pro for Powerline"/>
+                <a:sym typeface="Anonymous Pro for Powerline"/>
+              </a:defRPr>
+            </a:pPr>
+            <a:r>
+              <a:t>            </a:t>
+            </a:r>
+            <a:r>
+              <a:rPr>
+                <a:solidFill>
+                  <a:schemeClr val="accent3"/>
+                </a:solidFill>
+              </a:rPr>
+              <a:t>parse_dates=[‘Date'],</a:t>
+            </a:r>
+          </a:p>
+          <a:p>
+            <a:pPr>
+              <a:defRPr sz="5100">
+                <a:latin typeface="Anonymous Pro for Powerline"/>
+                <a:ea typeface="Anonymous Pro for Powerline"/>
+                <a:cs typeface="Anonymous Pro for Powerline"/>
+                <a:sym typeface="Anonymous Pro for Powerline"/>
+              </a:defRPr>
+            </a:pPr>
+            <a:r>
+              <a:rPr>
+                <a:solidFill>
+                  <a:schemeClr val="accent3"/>
+                </a:solidFill>
+              </a:rPr>
+              <a:t>            index_col='Date'</a:t>
+            </a:r>
+            <a:r>
+              <a:t>)</a:t>
+            </a:r>
+          </a:p>
+        </p:txBody>
+      </p:sp>
+    </p:spTree>
+  </p:cSld>
+  <p:clrMapOvr>
+    <a:masterClrMapping/>
+  </p:clrMapOvr>
+  <p:transition spd="med"/>
+</p:sld>
+</file>
+
+<file path=ppt/slides/slide20.xml><?xml version="1.0" encoding="utf-8"?>
 <p:sld xmlns:a="http://schemas.openxmlformats.org/drawingml/2006/main" xmlns:r="http://schemas.openxmlformats.org/officeDocument/2006/relationships" xmlns:p="http://schemas.openxmlformats.org/presentationml/2006/main">
   <p:cSld>
     <p:spTree>
@@ -12863,7 +12756,7 @@
 </p:sld>
 </file>
 
-<file path=ppt/slides/slide22.xml><?xml version="1.0" encoding="utf-8"?>
+<file path=ppt/slides/slide21.xml><?xml version="1.0" encoding="utf-8"?>
 <p:sld xmlns:a="http://schemas.openxmlformats.org/drawingml/2006/main" xmlns:r="http://schemas.openxmlformats.org/officeDocument/2006/relationships" xmlns:p="http://schemas.openxmlformats.org/presentationml/2006/main">
   <p:cSld>
     <p:spTree>
@@ -12985,7 +12878,7 @@
 </p:sld>
 </file>
 
-<file path=ppt/slides/slide23.xml><?xml version="1.0" encoding="utf-8"?>
+<file path=ppt/slides/slide22.xml><?xml version="1.0" encoding="utf-8"?>
 <p:sld xmlns:a="http://schemas.openxmlformats.org/drawingml/2006/main" xmlns:r="http://schemas.openxmlformats.org/officeDocument/2006/relationships" xmlns:p="http://schemas.openxmlformats.org/presentationml/2006/main">
   <p:cSld>
     <p:spTree>
@@ -13141,7 +13034,7 @@
 </p:sld>
 </file>
 
-<file path=ppt/slides/slide24.xml><?xml version="1.0" encoding="utf-8"?>
+<file path=ppt/slides/slide23.xml><?xml version="1.0" encoding="utf-8"?>
 <p:sld xmlns:a="http://schemas.openxmlformats.org/drawingml/2006/main" xmlns:r="http://schemas.openxmlformats.org/officeDocument/2006/relationships" xmlns:p="http://schemas.openxmlformats.org/presentationml/2006/main">
   <p:cSld>
     <p:spTree>
@@ -13355,7 +13248,7 @@
 </p:sld>
 </file>
 
-<file path=ppt/slides/slide25.xml><?xml version="1.0" encoding="utf-8"?>
+<file path=ppt/slides/slide24.xml><?xml version="1.0" encoding="utf-8"?>
 <p:sld xmlns:a="http://schemas.openxmlformats.org/drawingml/2006/main" xmlns:r="http://schemas.openxmlformats.org/officeDocument/2006/relationships" xmlns:p="http://schemas.openxmlformats.org/presentationml/2006/main">
   <p:cSld>
     <p:spTree>
@@ -13404,6 +13297,274 @@
     <p:extLst>
       <p:ext uri="{BB962C8B-B14F-4D97-AF65-F5344CB8AC3E}">
         <p14:creationId xmlns:p14="http://schemas.microsoft.com/office/powerpoint/2010/main" val="3051511813"/>
+      </p:ext>
+    </p:extLst>
+  </p:cSld>
+  <p:clrMapOvr>
+    <a:masterClrMapping/>
+  </p:clrMapOvr>
+  <p:transition spd="med"/>
+</p:sld>
+</file>
+
+<file path=ppt/slides/slide25.xml><?xml version="1.0" encoding="utf-8"?>
+<p:sld xmlns:a="http://schemas.openxmlformats.org/drawingml/2006/main" xmlns:r="http://schemas.openxmlformats.org/officeDocument/2006/relationships" xmlns:p="http://schemas.openxmlformats.org/presentationml/2006/main">
+  <p:cSld>
+    <p:spTree>
+      <p:nvGrpSpPr>
+        <p:cNvPr id="1" name=""/>
+        <p:cNvGrpSpPr/>
+        <p:nvPr/>
+      </p:nvGrpSpPr>
+      <p:grpSpPr>
+        <a:xfrm>
+          <a:off x="0" y="0"/>
+          <a:ext cx="0" cy="0"/>
+          <a:chOff x="0" y="0"/>
+          <a:chExt cx="0" cy="0"/>
+        </a:xfrm>
+      </p:grpSpPr>
+      <p:sp>
+        <p:nvSpPr>
+          <p:cNvPr id="2" name="Title 1">
+            <a:extLst>
+              <a:ext uri="{FF2B5EF4-FFF2-40B4-BE49-F238E27FC236}">
+                <a16:creationId xmlns:a16="http://schemas.microsoft.com/office/drawing/2014/main" id="{39B3561E-20CC-4BF4-AAAF-2FCA2B0BA20A}"/>
+              </a:ext>
+            </a:extLst>
+          </p:cNvPr>
+          <p:cNvSpPr>
+            <a:spLocks noGrp="1"/>
+          </p:cNvSpPr>
+          <p:nvPr>
+            <p:ph type="title"/>
+          </p:nvPr>
+        </p:nvSpPr>
+        <p:spPr/>
+        <p:txBody>
+          <a:bodyPr>
+            <a:normAutofit fontScale="90000"/>
+          </a:bodyPr>
+          <a:lstStyle/>
+          <a:p>
+            <a:r>
+              <a:rPr lang="en-US" dirty="0"/>
+              <a:t>A Little more complicated</a:t>
+            </a:r>
+          </a:p>
+        </p:txBody>
+      </p:sp>
+      <p:sp>
+        <p:nvSpPr>
+          <p:cNvPr id="3" name="Text Placeholder 2">
+            <a:extLst>
+              <a:ext uri="{FF2B5EF4-FFF2-40B4-BE49-F238E27FC236}">
+                <a16:creationId xmlns:a16="http://schemas.microsoft.com/office/drawing/2014/main" id="{FE0654B7-D2BC-412B-8801-8B222779B176}"/>
+              </a:ext>
+            </a:extLst>
+          </p:cNvPr>
+          <p:cNvSpPr>
+            <a:spLocks noGrp="1"/>
+          </p:cNvSpPr>
+          <p:nvPr>
+            <p:ph type="body" sz="quarter" idx="10"/>
+          </p:nvPr>
+        </p:nvSpPr>
+        <p:spPr/>
+        <p:txBody>
+          <a:bodyPr/>
+          <a:lstStyle/>
+          <a:p>
+            <a:pPr marL="0" indent="0">
+              <a:buNone/>
+            </a:pPr>
+            <a:r>
+              <a:rPr lang="en-US" dirty="0">
+                <a:latin typeface="Consolas" panose="020B0609020204030204" pitchFamily="49" charset="0"/>
+              </a:rPr>
+              <a:t>fig = </a:t>
+            </a:r>
+            <a:r>
+              <a:rPr lang="en-US" dirty="0" err="1">
+                <a:latin typeface="Consolas" panose="020B0609020204030204" pitchFamily="49" charset="0"/>
+              </a:rPr>
+              <a:t>plt.figure</a:t>
+            </a:r>
+            <a:r>
+              <a:rPr lang="en-US" dirty="0">
+                <a:latin typeface="Consolas" panose="020B0609020204030204" pitchFamily="49" charset="0"/>
+              </a:rPr>
+              <a:t>(</a:t>
+            </a:r>
+            <a:r>
+              <a:rPr lang="en-US" dirty="0" err="1">
+                <a:latin typeface="Consolas" panose="020B0609020204030204" pitchFamily="49" charset="0"/>
+              </a:rPr>
+              <a:t>figsize</a:t>
+            </a:r>
+            <a:r>
+              <a:rPr lang="en-US" dirty="0">
+                <a:latin typeface="Consolas" panose="020B0609020204030204" pitchFamily="49" charset="0"/>
+              </a:rPr>
+              <a:t>=(width,    </a:t>
+            </a:r>
+          </a:p>
+          <a:p>
+            <a:pPr marL="0" indent="0">
+              <a:buNone/>
+            </a:pPr>
+            <a:r>
+              <a:rPr lang="en-US" dirty="0">
+                <a:latin typeface="Consolas" panose="020B0609020204030204" pitchFamily="49" charset="0"/>
+              </a:rPr>
+              <a:t>                          height))</a:t>
+            </a:r>
+          </a:p>
+          <a:p>
+            <a:pPr marL="0" indent="0">
+              <a:buNone/>
+            </a:pPr>
+            <a:r>
+              <a:rPr lang="en-US" dirty="0">
+                <a:latin typeface="Consolas" panose="020B0609020204030204" pitchFamily="49" charset="0"/>
+              </a:rPr>
+              <a:t>ax = </a:t>
+            </a:r>
+            <a:r>
+              <a:rPr lang="en-US" dirty="0" err="1">
+                <a:latin typeface="Consolas" panose="020B0609020204030204" pitchFamily="49" charset="0"/>
+              </a:rPr>
+              <a:t>fig.add_subplot</a:t>
+            </a:r>
+            <a:r>
+              <a:rPr lang="en-US" dirty="0">
+                <a:latin typeface="Consolas" panose="020B0609020204030204" pitchFamily="49" charset="0"/>
+              </a:rPr>
+              <a:t>(</a:t>
+            </a:r>
+            <a:r>
+              <a:rPr lang="en-US" dirty="0" err="1">
+                <a:latin typeface="Consolas" panose="020B0609020204030204" pitchFamily="49" charset="0"/>
+              </a:rPr>
+              <a:t>grid_rows</a:t>
+            </a:r>
+            <a:r>
+              <a:rPr lang="en-US" dirty="0">
+                <a:latin typeface="Consolas" panose="020B0609020204030204" pitchFamily="49" charset="0"/>
+              </a:rPr>
+              <a:t>, </a:t>
+            </a:r>
+          </a:p>
+          <a:p>
+            <a:pPr marL="0" indent="0">
+              <a:buNone/>
+            </a:pPr>
+            <a:r>
+              <a:rPr lang="en-US" dirty="0">
+                <a:latin typeface="Consolas" panose="020B0609020204030204" pitchFamily="49" charset="0"/>
+              </a:rPr>
+              <a:t>                     </a:t>
+            </a:r>
+            <a:r>
+              <a:rPr lang="en-US" dirty="0" err="1">
+                <a:latin typeface="Consolas" panose="020B0609020204030204" pitchFamily="49" charset="0"/>
+              </a:rPr>
+              <a:t>grid_columns</a:t>
+            </a:r>
+            <a:r>
+              <a:rPr lang="en-US" dirty="0">
+                <a:latin typeface="Consolas" panose="020B0609020204030204" pitchFamily="49" charset="0"/>
+              </a:rPr>
+              <a:t>,               </a:t>
+            </a:r>
+          </a:p>
+          <a:p>
+            <a:pPr marL="0" indent="0">
+              <a:buNone/>
+            </a:pPr>
+            <a:r>
+              <a:rPr lang="en-US" dirty="0">
+                <a:latin typeface="Consolas" panose="020B0609020204030204" pitchFamily="49" charset="0"/>
+              </a:rPr>
+              <a:t>                     </a:t>
+            </a:r>
+            <a:r>
+              <a:rPr lang="en-US" dirty="0" err="1">
+                <a:latin typeface="Consolas" panose="020B0609020204030204" pitchFamily="49" charset="0"/>
+              </a:rPr>
+              <a:t>subplot_position</a:t>
+            </a:r>
+            <a:r>
+              <a:rPr lang="en-US" dirty="0">
+                <a:latin typeface="Consolas" panose="020B0609020204030204" pitchFamily="49" charset="0"/>
+              </a:rPr>
+              <a:t>)</a:t>
+            </a:r>
+          </a:p>
+          <a:p>
+            <a:pPr marL="0" indent="0">
+              <a:buNone/>
+            </a:pPr>
+            <a:r>
+              <a:rPr lang="en-US" dirty="0" err="1">
+                <a:latin typeface="Consolas" panose="020B0609020204030204" pitchFamily="49" charset="0"/>
+              </a:rPr>
+              <a:t>ax.plot</a:t>
+            </a:r>
+            <a:r>
+              <a:rPr lang="en-US" dirty="0">
+                <a:latin typeface="Consolas" panose="020B0609020204030204" pitchFamily="49" charset="0"/>
+              </a:rPr>
+              <a:t>(</a:t>
+            </a:r>
+            <a:r>
+              <a:rPr lang="en-US" dirty="0" err="1">
+                <a:latin typeface="Consolas" panose="020B0609020204030204" pitchFamily="49" charset="0"/>
+              </a:rPr>
+              <a:t>x_data</a:t>
+            </a:r>
+            <a:r>
+              <a:rPr lang="en-US" dirty="0">
+                <a:latin typeface="Consolas" panose="020B0609020204030204" pitchFamily="49" charset="0"/>
+              </a:rPr>
+              <a:t>, </a:t>
+            </a:r>
+            <a:r>
+              <a:rPr lang="en-US" dirty="0" err="1">
+                <a:latin typeface="Consolas" panose="020B0609020204030204" pitchFamily="49" charset="0"/>
+              </a:rPr>
+              <a:t>y_data</a:t>
+            </a:r>
+            <a:r>
+              <a:rPr lang="en-US" dirty="0">
+                <a:latin typeface="Consolas" panose="020B0609020204030204" pitchFamily="49" charset="0"/>
+              </a:rPr>
+              <a:t>)</a:t>
+            </a:r>
+          </a:p>
+          <a:p>
+            <a:pPr marL="0" indent="0">
+              <a:buNone/>
+            </a:pPr>
+            <a:r>
+              <a:rPr lang="en-US" dirty="0" err="1">
+                <a:latin typeface="Consolas" panose="020B0609020204030204" pitchFamily="49" charset="0"/>
+              </a:rPr>
+              <a:t>plt.show</a:t>
+            </a:r>
+            <a:r>
+              <a:rPr lang="en-US" dirty="0">
+                <a:latin typeface="Consolas" panose="020B0609020204030204" pitchFamily="49" charset="0"/>
+              </a:rPr>
+              <a:t>()</a:t>
+            </a:r>
+          </a:p>
+        </p:txBody>
+      </p:sp>
+    </p:spTree>
+    <p:extLst>
+      <p:ext uri="{BB962C8B-B14F-4D97-AF65-F5344CB8AC3E}">
+        <p14:creationId xmlns:p14="http://schemas.microsoft.com/office/powerpoint/2010/main" val="405098831"/>
       </p:ext>
     </p:extLst>
   </p:cSld>
@@ -13456,274 +13617,6 @@
           <a:p>
             <a:r>
               <a:rPr lang="en-US" dirty="0"/>
-              <a:t>A Little more complicated</a:t>
-            </a:r>
-          </a:p>
-        </p:txBody>
-      </p:sp>
-      <p:sp>
-        <p:nvSpPr>
-          <p:cNvPr id="3" name="Text Placeholder 2">
-            <a:extLst>
-              <a:ext uri="{FF2B5EF4-FFF2-40B4-BE49-F238E27FC236}">
-                <a16:creationId xmlns:a16="http://schemas.microsoft.com/office/drawing/2014/main" id="{FE0654B7-D2BC-412B-8801-8B222779B176}"/>
-              </a:ext>
-            </a:extLst>
-          </p:cNvPr>
-          <p:cNvSpPr>
-            <a:spLocks noGrp="1"/>
-          </p:cNvSpPr>
-          <p:nvPr>
-            <p:ph type="body" sz="quarter" idx="10"/>
-          </p:nvPr>
-        </p:nvSpPr>
-        <p:spPr/>
-        <p:txBody>
-          <a:bodyPr/>
-          <a:lstStyle/>
-          <a:p>
-            <a:pPr marL="0" indent="0">
-              <a:buNone/>
-            </a:pPr>
-            <a:r>
-              <a:rPr lang="en-US" dirty="0">
-                <a:latin typeface="Consolas" panose="020B0609020204030204" pitchFamily="49" charset="0"/>
-              </a:rPr>
-              <a:t>fig = </a:t>
-            </a:r>
-            <a:r>
-              <a:rPr lang="en-US" dirty="0" err="1">
-                <a:latin typeface="Consolas" panose="020B0609020204030204" pitchFamily="49" charset="0"/>
-              </a:rPr>
-              <a:t>plt.figure</a:t>
-            </a:r>
-            <a:r>
-              <a:rPr lang="en-US" dirty="0">
-                <a:latin typeface="Consolas" panose="020B0609020204030204" pitchFamily="49" charset="0"/>
-              </a:rPr>
-              <a:t>(</a:t>
-            </a:r>
-            <a:r>
-              <a:rPr lang="en-US" dirty="0" err="1">
-                <a:latin typeface="Consolas" panose="020B0609020204030204" pitchFamily="49" charset="0"/>
-              </a:rPr>
-              <a:t>figsize</a:t>
-            </a:r>
-            <a:r>
-              <a:rPr lang="en-US" dirty="0">
-                <a:latin typeface="Consolas" panose="020B0609020204030204" pitchFamily="49" charset="0"/>
-              </a:rPr>
-              <a:t>=(width,    </a:t>
-            </a:r>
-          </a:p>
-          <a:p>
-            <a:pPr marL="0" indent="0">
-              <a:buNone/>
-            </a:pPr>
-            <a:r>
-              <a:rPr lang="en-US" dirty="0">
-                <a:latin typeface="Consolas" panose="020B0609020204030204" pitchFamily="49" charset="0"/>
-              </a:rPr>
-              <a:t>                          height))</a:t>
-            </a:r>
-          </a:p>
-          <a:p>
-            <a:pPr marL="0" indent="0">
-              <a:buNone/>
-            </a:pPr>
-            <a:r>
-              <a:rPr lang="en-US" dirty="0">
-                <a:latin typeface="Consolas" panose="020B0609020204030204" pitchFamily="49" charset="0"/>
-              </a:rPr>
-              <a:t>ax = </a:t>
-            </a:r>
-            <a:r>
-              <a:rPr lang="en-US" dirty="0" err="1">
-                <a:latin typeface="Consolas" panose="020B0609020204030204" pitchFamily="49" charset="0"/>
-              </a:rPr>
-              <a:t>fig.add_subplot</a:t>
-            </a:r>
-            <a:r>
-              <a:rPr lang="en-US" dirty="0">
-                <a:latin typeface="Consolas" panose="020B0609020204030204" pitchFamily="49" charset="0"/>
-              </a:rPr>
-              <a:t>(</a:t>
-            </a:r>
-            <a:r>
-              <a:rPr lang="en-US" dirty="0" err="1">
-                <a:latin typeface="Consolas" panose="020B0609020204030204" pitchFamily="49" charset="0"/>
-              </a:rPr>
-              <a:t>grid_rows</a:t>
-            </a:r>
-            <a:r>
-              <a:rPr lang="en-US" dirty="0">
-                <a:latin typeface="Consolas" panose="020B0609020204030204" pitchFamily="49" charset="0"/>
-              </a:rPr>
-              <a:t>, </a:t>
-            </a:r>
-          </a:p>
-          <a:p>
-            <a:pPr marL="0" indent="0">
-              <a:buNone/>
-            </a:pPr>
-            <a:r>
-              <a:rPr lang="en-US" dirty="0">
-                <a:latin typeface="Consolas" panose="020B0609020204030204" pitchFamily="49" charset="0"/>
-              </a:rPr>
-              <a:t>                     </a:t>
-            </a:r>
-            <a:r>
-              <a:rPr lang="en-US" dirty="0" err="1">
-                <a:latin typeface="Consolas" panose="020B0609020204030204" pitchFamily="49" charset="0"/>
-              </a:rPr>
-              <a:t>grid_columns</a:t>
-            </a:r>
-            <a:r>
-              <a:rPr lang="en-US" dirty="0">
-                <a:latin typeface="Consolas" panose="020B0609020204030204" pitchFamily="49" charset="0"/>
-              </a:rPr>
-              <a:t>,               </a:t>
-            </a:r>
-          </a:p>
-          <a:p>
-            <a:pPr marL="0" indent="0">
-              <a:buNone/>
-            </a:pPr>
-            <a:r>
-              <a:rPr lang="en-US" dirty="0">
-                <a:latin typeface="Consolas" panose="020B0609020204030204" pitchFamily="49" charset="0"/>
-              </a:rPr>
-              <a:t>                     </a:t>
-            </a:r>
-            <a:r>
-              <a:rPr lang="en-US" dirty="0" err="1">
-                <a:latin typeface="Consolas" panose="020B0609020204030204" pitchFamily="49" charset="0"/>
-              </a:rPr>
-              <a:t>subplot_position</a:t>
-            </a:r>
-            <a:r>
-              <a:rPr lang="en-US" dirty="0">
-                <a:latin typeface="Consolas" panose="020B0609020204030204" pitchFamily="49" charset="0"/>
-              </a:rPr>
-              <a:t>)</a:t>
-            </a:r>
-          </a:p>
-          <a:p>
-            <a:pPr marL="0" indent="0">
-              <a:buNone/>
-            </a:pPr>
-            <a:r>
-              <a:rPr lang="en-US" dirty="0" err="1">
-                <a:latin typeface="Consolas" panose="020B0609020204030204" pitchFamily="49" charset="0"/>
-              </a:rPr>
-              <a:t>ax.plot</a:t>
-            </a:r>
-            <a:r>
-              <a:rPr lang="en-US" dirty="0">
-                <a:latin typeface="Consolas" panose="020B0609020204030204" pitchFamily="49" charset="0"/>
-              </a:rPr>
-              <a:t>(</a:t>
-            </a:r>
-            <a:r>
-              <a:rPr lang="en-US" dirty="0" err="1">
-                <a:latin typeface="Consolas" panose="020B0609020204030204" pitchFamily="49" charset="0"/>
-              </a:rPr>
-              <a:t>x_data</a:t>
-            </a:r>
-            <a:r>
-              <a:rPr lang="en-US" dirty="0">
-                <a:latin typeface="Consolas" panose="020B0609020204030204" pitchFamily="49" charset="0"/>
-              </a:rPr>
-              <a:t>, </a:t>
-            </a:r>
-            <a:r>
-              <a:rPr lang="en-US" dirty="0" err="1">
-                <a:latin typeface="Consolas" panose="020B0609020204030204" pitchFamily="49" charset="0"/>
-              </a:rPr>
-              <a:t>y_data</a:t>
-            </a:r>
-            <a:r>
-              <a:rPr lang="en-US" dirty="0">
-                <a:latin typeface="Consolas" panose="020B0609020204030204" pitchFamily="49" charset="0"/>
-              </a:rPr>
-              <a:t>)</a:t>
-            </a:r>
-          </a:p>
-          <a:p>
-            <a:pPr marL="0" indent="0">
-              <a:buNone/>
-            </a:pPr>
-            <a:r>
-              <a:rPr lang="en-US" dirty="0" err="1">
-                <a:latin typeface="Consolas" panose="020B0609020204030204" pitchFamily="49" charset="0"/>
-              </a:rPr>
-              <a:t>plt.show</a:t>
-            </a:r>
-            <a:r>
-              <a:rPr lang="en-US" dirty="0">
-                <a:latin typeface="Consolas" panose="020B0609020204030204" pitchFamily="49" charset="0"/>
-              </a:rPr>
-              <a:t>()</a:t>
-            </a:r>
-          </a:p>
-        </p:txBody>
-      </p:sp>
-    </p:spTree>
-    <p:extLst>
-      <p:ext uri="{BB962C8B-B14F-4D97-AF65-F5344CB8AC3E}">
-        <p14:creationId xmlns:p14="http://schemas.microsoft.com/office/powerpoint/2010/main" val="405098831"/>
-      </p:ext>
-    </p:extLst>
-  </p:cSld>
-  <p:clrMapOvr>
-    <a:masterClrMapping/>
-  </p:clrMapOvr>
-  <p:transition spd="med"/>
-</p:sld>
-</file>
-
-<file path=ppt/slides/slide27.xml><?xml version="1.0" encoding="utf-8"?>
-<p:sld xmlns:a="http://schemas.openxmlformats.org/drawingml/2006/main" xmlns:r="http://schemas.openxmlformats.org/officeDocument/2006/relationships" xmlns:p="http://schemas.openxmlformats.org/presentationml/2006/main">
-  <p:cSld>
-    <p:spTree>
-      <p:nvGrpSpPr>
-        <p:cNvPr id="1" name=""/>
-        <p:cNvGrpSpPr/>
-        <p:nvPr/>
-      </p:nvGrpSpPr>
-      <p:grpSpPr>
-        <a:xfrm>
-          <a:off x="0" y="0"/>
-          <a:ext cx="0" cy="0"/>
-          <a:chOff x="0" y="0"/>
-          <a:chExt cx="0" cy="0"/>
-        </a:xfrm>
-      </p:grpSpPr>
-      <p:sp>
-        <p:nvSpPr>
-          <p:cNvPr id="2" name="Title 1">
-            <a:extLst>
-              <a:ext uri="{FF2B5EF4-FFF2-40B4-BE49-F238E27FC236}">
-                <a16:creationId xmlns:a16="http://schemas.microsoft.com/office/drawing/2014/main" id="{39B3561E-20CC-4BF4-AAAF-2FCA2B0BA20A}"/>
-              </a:ext>
-            </a:extLst>
-          </p:cNvPr>
-          <p:cNvSpPr>
-            <a:spLocks noGrp="1"/>
-          </p:cNvSpPr>
-          <p:nvPr>
-            <p:ph type="title"/>
-          </p:nvPr>
-        </p:nvSpPr>
-        <p:spPr/>
-        <p:txBody>
-          <a:bodyPr>
-            <a:normAutofit fontScale="90000"/>
-          </a:bodyPr>
-          <a:lstStyle/>
-          <a:p>
-            <a:r>
-              <a:rPr lang="en-US" dirty="0"/>
               <a:t>Subplots</a:t>
             </a:r>
           </a:p>
@@ -13917,7 +13810,7 @@
 </p:sld>
 </file>
 
-<file path=ppt/slides/slide28.xml><?xml version="1.0" encoding="utf-8"?>
+<file path=ppt/slides/slide27.xml><?xml version="1.0" encoding="utf-8"?>
 <p:sld xmlns:a="http://schemas.openxmlformats.org/drawingml/2006/main" xmlns:r="http://schemas.openxmlformats.org/officeDocument/2006/relationships" xmlns:p="http://schemas.openxmlformats.org/presentationml/2006/main">
   <p:cSld>
     <p:spTree>
@@ -14370,7 +14263,7 @@
 </p:sld>
 </file>
 
-<file path=ppt/slides/slide29.xml><?xml version="1.0" encoding="utf-8"?>
+<file path=ppt/slides/slide28.xml><?xml version="1.0" encoding="utf-8"?>
 <p:sld xmlns:a="http://schemas.openxmlformats.org/drawingml/2006/main" xmlns:r="http://schemas.openxmlformats.org/officeDocument/2006/relationships" xmlns:p="http://schemas.openxmlformats.org/presentationml/2006/main">
   <p:cSld>
     <p:spTree>
@@ -14620,156 +14513,7 @@
 </p:sld>
 </file>
 
-<file path=ppt/slides/slide3.xml><?xml version="1.0" encoding="utf-8"?>
-<p:sld xmlns:a="http://schemas.openxmlformats.org/drawingml/2006/main" xmlns:r="http://schemas.openxmlformats.org/officeDocument/2006/relationships" xmlns:p="http://schemas.openxmlformats.org/presentationml/2006/main">
-  <p:cSld>
-    <p:spTree>
-      <p:nvGrpSpPr>
-        <p:cNvPr id="1" name=""/>
-        <p:cNvGrpSpPr/>
-        <p:nvPr/>
-      </p:nvGrpSpPr>
-      <p:grpSpPr>
-        <a:xfrm>
-          <a:off x="0" y="0"/>
-          <a:ext cx="0" cy="0"/>
-          <a:chOff x="0" y="0"/>
-          <a:chExt cx="0" cy="0"/>
-        </a:xfrm>
-      </p:grpSpPr>
-      <p:sp>
-        <p:nvSpPr>
-          <p:cNvPr id="259" name="Shape 259"/>
-          <p:cNvSpPr>
-            <a:spLocks noGrp="1"/>
-          </p:cNvSpPr>
-          <p:nvPr>
-            <p:ph type="title"/>
-          </p:nvPr>
-        </p:nvSpPr>
-        <p:spPr>
-          <a:xfrm>
-            <a:off x="406400" y="1536700"/>
-            <a:ext cx="12192000" cy="1169260"/>
-          </a:xfrm>
-          <a:prstGeom prst="rect">
-            <a:avLst/>
-          </a:prstGeom>
-        </p:spPr>
-        <p:txBody>
-          <a:bodyPr/>
-          <a:lstStyle>
-            <a:lvl1pPr defTabSz="403097">
-              <a:spcBef>
-                <a:spcPts val="1900"/>
-              </a:spcBef>
-              <a:defRPr sz="8280"/>
-            </a:lvl1pPr>
-          </a:lstStyle>
-          <a:p>
-            <a:r>
-              <a:t>Dataframe from dicts</a:t>
-            </a:r>
-          </a:p>
-        </p:txBody>
-      </p:sp>
-      <p:sp>
-        <p:nvSpPr>
-          <p:cNvPr id="260" name="Shape 260"/>
-          <p:cNvSpPr/>
-          <p:nvPr/>
-        </p:nvSpPr>
-        <p:spPr>
-          <a:xfrm>
-            <a:off x="604849" y="4757670"/>
-            <a:ext cx="11795102" cy="876301"/>
-          </a:xfrm>
-          <a:prstGeom prst="rect">
-            <a:avLst/>
-          </a:prstGeom>
-          <a:ln w="12700">
-            <a:miter lim="400000"/>
-          </a:ln>
-          <a:extLst>
-            <a:ext uri="{C572A759-6A51-4108-AA02-DFA0A04FC94B}">
-              <ma14:wrappingTextBoxFlag xmlns:ma14="http://schemas.microsoft.com/office/mac/drawingml/2011/main" xmlns="" val="1"/>
-            </a:ext>
-          </a:extLst>
-        </p:spPr>
-        <p:txBody>
-          <a:bodyPr lIns="50800" tIns="50800" rIns="50800" bIns="50800" anchor="ctr">
-            <a:spAutoFit/>
-          </a:bodyPr>
-          <a:lstStyle>
-            <a:lvl1pPr>
-              <a:defRPr sz="5100">
-                <a:latin typeface="Anonymous Pro for Powerline"/>
-                <a:ea typeface="Anonymous Pro for Powerline"/>
-                <a:cs typeface="Anonymous Pro for Powerline"/>
-                <a:sym typeface="Anonymous Pro for Powerline"/>
-              </a:defRPr>
-            </a:lvl1pPr>
-          </a:lstStyle>
-          <a:p>
-            <a:r>
-              <a:t>pd.DataFrame.from_dict(dict_list)</a:t>
-            </a:r>
-          </a:p>
-        </p:txBody>
-      </p:sp>
-      <p:sp>
-        <p:nvSpPr>
-          <p:cNvPr id="261" name="Shape 261"/>
-          <p:cNvSpPr/>
-          <p:nvPr/>
-        </p:nvSpPr>
-        <p:spPr>
-          <a:xfrm>
-            <a:off x="904881" y="6663814"/>
-            <a:ext cx="10671049" cy="1143001"/>
-          </a:xfrm>
-          <a:prstGeom prst="rect">
-            <a:avLst/>
-          </a:prstGeom>
-          <a:ln w="12700">
-            <a:miter lim="400000"/>
-          </a:ln>
-          <a:extLst>
-            <a:ext uri="{C572A759-6A51-4108-AA02-DFA0A04FC94B}">
-              <ma14:wrappingTextBoxFlag xmlns:ma14="http://schemas.microsoft.com/office/mac/drawingml/2011/main" xmlns="" val="1"/>
-            </a:ext>
-          </a:extLst>
-        </p:spPr>
-        <p:txBody>
-          <a:bodyPr wrap="none" lIns="50800" tIns="50800" rIns="50800" bIns="50800" anchor="ctr">
-            <a:spAutoFit/>
-          </a:bodyPr>
-          <a:lstStyle>
-            <a:lvl1pPr>
-              <a:defRPr sz="6000">
-                <a:solidFill>
-                  <a:schemeClr val="accent5"/>
-                </a:solidFill>
-              </a:defRPr>
-            </a:lvl1pPr>
-          </a:lstStyle>
-          <a:p>
-            <a:r>
-              <a:t>Dicts must all have same keys!</a:t>
-            </a:r>
-          </a:p>
-        </p:txBody>
-      </p:sp>
-    </p:spTree>
-  </p:cSld>
-  <p:clrMapOvr>
-    <a:masterClrMapping/>
-  </p:clrMapOvr>
-  <p:transition spd="med"/>
-</p:sld>
-</file>
-
-<file path=ppt/slides/slide30.xml><?xml version="1.0" encoding="utf-8"?>
+<file path=ppt/slides/slide29.xml><?xml version="1.0" encoding="utf-8"?>
 <p:sld xmlns:a="http://schemas.openxmlformats.org/drawingml/2006/main" xmlns:r="http://schemas.openxmlformats.org/officeDocument/2006/relationships" xmlns:p="http://schemas.openxmlformats.org/presentationml/2006/main" show="0">
   <p:cSld>
     <p:spTree>
@@ -15014,577 +14758,7 @@
 </p:sld>
 </file>
 
-<file path=ppt/slides/slide31.xml><?xml version="1.0" encoding="utf-8"?>
-<p:sld xmlns:a="http://schemas.openxmlformats.org/drawingml/2006/main" xmlns:r="http://schemas.openxmlformats.org/officeDocument/2006/relationships" xmlns:p="http://schemas.openxmlformats.org/presentationml/2006/main" show="0">
-  <p:cSld>
-    <p:spTree>
-      <p:nvGrpSpPr>
-        <p:cNvPr id="1" name=""/>
-        <p:cNvGrpSpPr/>
-        <p:nvPr/>
-      </p:nvGrpSpPr>
-      <p:grpSpPr>
-        <a:xfrm>
-          <a:off x="0" y="0"/>
-          <a:ext cx="0" cy="0"/>
-          <a:chOff x="0" y="0"/>
-          <a:chExt cx="0" cy="0"/>
-        </a:xfrm>
-      </p:grpSpPr>
-      <p:sp>
-        <p:nvSpPr>
-          <p:cNvPr id="2" name="Title 1">
-            <a:extLst>
-              <a:ext uri="{FF2B5EF4-FFF2-40B4-BE49-F238E27FC236}">
-                <a16:creationId xmlns:a16="http://schemas.microsoft.com/office/drawing/2014/main" id="{3DC766B5-F81C-438A-93E2-C1540F0A0079}"/>
-              </a:ext>
-            </a:extLst>
-          </p:cNvPr>
-          <p:cNvSpPr>
-            <a:spLocks noGrp="1"/>
-          </p:cNvSpPr>
-          <p:nvPr>
-            <p:ph type="title"/>
-          </p:nvPr>
-        </p:nvSpPr>
-        <p:spPr/>
-        <p:txBody>
-          <a:bodyPr>
-            <a:normAutofit fontScale="90000"/>
-          </a:bodyPr>
-          <a:lstStyle/>
-          <a:p>
-            <a:r>
-              <a:rPr lang="en-US" dirty="0"/>
-              <a:t>Example: 5-to-1</a:t>
-            </a:r>
-          </a:p>
-        </p:txBody>
-      </p:sp>
-      <p:sp>
-        <p:nvSpPr>
-          <p:cNvPr id="3" name="Text Placeholder 2">
-            <a:extLst>
-              <a:ext uri="{FF2B5EF4-FFF2-40B4-BE49-F238E27FC236}">
-                <a16:creationId xmlns:a16="http://schemas.microsoft.com/office/drawing/2014/main" id="{6AE86592-18EB-4A5A-86D7-92D6EB9F0C4C}"/>
-              </a:ext>
-            </a:extLst>
-          </p:cNvPr>
-          <p:cNvSpPr>
-            <a:spLocks noGrp="1"/>
-          </p:cNvSpPr>
-          <p:nvPr>
-            <p:ph type="body" sz="quarter" idx="10"/>
-          </p:nvPr>
-        </p:nvSpPr>
-        <p:spPr/>
-        <p:txBody>
-          <a:bodyPr/>
-          <a:lstStyle/>
-          <a:p>
-            <a:pPr marL="0" indent="0">
-              <a:buNone/>
-            </a:pPr>
-            <a:r>
-              <a:rPr lang="en-US" dirty="0">
-                <a:latin typeface="Consolas" panose="020B0609020204030204" pitchFamily="49" charset="0"/>
-              </a:rPr>
-              <a:t>fig = </a:t>
-            </a:r>
-            <a:r>
-              <a:rPr lang="en-US" dirty="0" err="1">
-                <a:latin typeface="Consolas" panose="020B0609020204030204" pitchFamily="49" charset="0"/>
-              </a:rPr>
-              <a:t>plt.figure</a:t>
-            </a:r>
-            <a:r>
-              <a:rPr lang="en-US" dirty="0">
-                <a:latin typeface="Consolas" panose="020B0609020204030204" pitchFamily="49" charset="0"/>
-              </a:rPr>
-              <a:t>()</a:t>
-            </a:r>
-          </a:p>
-          <a:p>
-            <a:pPr marL="0" indent="0">
-              <a:buNone/>
-            </a:pPr>
-            <a:r>
-              <a:rPr lang="en-US" dirty="0" err="1">
-                <a:latin typeface="Consolas" panose="020B0609020204030204" pitchFamily="49" charset="0"/>
-              </a:rPr>
-              <a:t>gs</a:t>
-            </a:r>
-            <a:r>
-              <a:rPr lang="en-US" dirty="0">
-                <a:latin typeface="Consolas" panose="020B0609020204030204" pitchFamily="49" charset="0"/>
-              </a:rPr>
-              <a:t> = </a:t>
-            </a:r>
-            <a:r>
-              <a:rPr lang="en-US" dirty="0" err="1">
-                <a:latin typeface="Consolas" panose="020B0609020204030204" pitchFamily="49" charset="0"/>
-              </a:rPr>
-              <a:t>fig.add_gridspec</a:t>
-            </a:r>
-            <a:r>
-              <a:rPr lang="en-US" dirty="0">
-                <a:latin typeface="Consolas" panose="020B0609020204030204" pitchFamily="49" charset="0"/>
-              </a:rPr>
-              <a:t>(6, 1)</a:t>
-            </a:r>
-          </a:p>
-          <a:p>
-            <a:pPr marL="0" indent="0">
-              <a:buNone/>
-            </a:pPr>
-            <a:r>
-              <a:rPr lang="en-US" dirty="0">
-                <a:latin typeface="Consolas" panose="020B0609020204030204" pitchFamily="49" charset="0"/>
-              </a:rPr>
-              <a:t>ax1 = </a:t>
-            </a:r>
-            <a:r>
-              <a:rPr lang="en-US" dirty="0" err="1">
-                <a:latin typeface="Consolas" panose="020B0609020204030204" pitchFamily="49" charset="0"/>
-              </a:rPr>
-              <a:t>fig.add_subplot</a:t>
-            </a:r>
-            <a:r>
-              <a:rPr lang="en-US" dirty="0">
-                <a:latin typeface="Consolas" panose="020B0609020204030204" pitchFamily="49" charset="0"/>
-              </a:rPr>
-              <a:t>(</a:t>
-            </a:r>
-            <a:r>
-              <a:rPr lang="en-US" dirty="0" err="1">
-                <a:latin typeface="Consolas" panose="020B0609020204030204" pitchFamily="49" charset="0"/>
-              </a:rPr>
-              <a:t>gs</a:t>
-            </a:r>
-            <a:r>
-              <a:rPr lang="en-US" dirty="0">
-                <a:latin typeface="Consolas" panose="020B0609020204030204" pitchFamily="49" charset="0"/>
-              </a:rPr>
-              <a:t>[0:6, 1])</a:t>
-            </a:r>
-          </a:p>
-          <a:p>
-            <a:pPr marL="0" indent="0">
-              <a:buNone/>
-            </a:pPr>
-            <a:r>
-              <a:rPr lang="en-US" dirty="0">
-                <a:latin typeface="Consolas" panose="020B0609020204030204" pitchFamily="49" charset="0"/>
-              </a:rPr>
-              <a:t>ax1.plot(xs1, ys1)</a:t>
-            </a:r>
-          </a:p>
-          <a:p>
-            <a:pPr marL="0" indent="0">
-              <a:buNone/>
-            </a:pPr>
-            <a:r>
-              <a:rPr lang="en-US" dirty="0">
-                <a:latin typeface="Consolas" panose="020B0609020204030204" pitchFamily="49" charset="0"/>
-              </a:rPr>
-              <a:t>ax2 = </a:t>
-            </a:r>
-            <a:r>
-              <a:rPr lang="en-US" dirty="0" err="1">
-                <a:latin typeface="Consolas" panose="020B0609020204030204" pitchFamily="49" charset="0"/>
-              </a:rPr>
-              <a:t>fig.add_subplot</a:t>
-            </a:r>
-            <a:r>
-              <a:rPr lang="en-US" dirty="0">
-                <a:latin typeface="Consolas" panose="020B0609020204030204" pitchFamily="49" charset="0"/>
-              </a:rPr>
-              <a:t>(</a:t>
-            </a:r>
-            <a:r>
-              <a:rPr lang="en-US" dirty="0" err="1">
-                <a:latin typeface="Consolas" panose="020B0609020204030204" pitchFamily="49" charset="0"/>
-              </a:rPr>
-              <a:t>gs</a:t>
-            </a:r>
-            <a:r>
-              <a:rPr lang="en-US" dirty="0">
-                <a:latin typeface="Consolas" panose="020B0609020204030204" pitchFamily="49" charset="0"/>
-              </a:rPr>
-              <a:t>[6, 1])</a:t>
-            </a:r>
-          </a:p>
-          <a:p>
-            <a:pPr marL="0" indent="0">
-              <a:buNone/>
-            </a:pPr>
-            <a:r>
-              <a:rPr lang="en-US" dirty="0">
-                <a:latin typeface="Consolas" panose="020B0609020204030204" pitchFamily="49" charset="0"/>
-              </a:rPr>
-              <a:t>ax2.plot(xs2, ys2)</a:t>
-            </a:r>
-          </a:p>
-          <a:p>
-            <a:pPr marL="0" indent="0">
-              <a:buNone/>
-            </a:pPr>
-            <a:r>
-              <a:rPr lang="en-US" dirty="0" err="1">
-                <a:latin typeface="Consolas" panose="020B0609020204030204" pitchFamily="49" charset="0"/>
-              </a:rPr>
-              <a:t>plt.show</a:t>
-            </a:r>
-            <a:r>
-              <a:rPr lang="en-US" dirty="0">
-                <a:latin typeface="Consolas" panose="020B0609020204030204" pitchFamily="49" charset="0"/>
-              </a:rPr>
-              <a:t>()</a:t>
-            </a:r>
-            <a:endParaRPr lang="en-US" dirty="0"/>
-          </a:p>
-        </p:txBody>
-      </p:sp>
-    </p:spTree>
-    <p:extLst>
-      <p:ext uri="{BB962C8B-B14F-4D97-AF65-F5344CB8AC3E}">
-        <p14:creationId xmlns:p14="http://schemas.microsoft.com/office/powerpoint/2010/main" val="180084786"/>
-      </p:ext>
-    </p:extLst>
-  </p:cSld>
-  <p:clrMapOvr>
-    <a:masterClrMapping/>
-  </p:clrMapOvr>
-  <p:transition spd="med"/>
-</p:sld>
-</file>
-
-<file path=ppt/slides/slide32.xml><?xml version="1.0" encoding="utf-8"?>
-<p:sld xmlns:a="http://schemas.openxmlformats.org/drawingml/2006/main" xmlns:r="http://schemas.openxmlformats.org/officeDocument/2006/relationships" xmlns:p="http://schemas.openxmlformats.org/presentationml/2006/main">
-  <p:cSld>
-    <p:spTree>
-      <p:nvGrpSpPr>
-        <p:cNvPr id="1" name=""/>
-        <p:cNvGrpSpPr/>
-        <p:nvPr/>
-      </p:nvGrpSpPr>
-      <p:grpSpPr>
-        <a:xfrm>
-          <a:off x="0" y="0"/>
-          <a:ext cx="0" cy="0"/>
-          <a:chOff x="0" y="0"/>
-          <a:chExt cx="0" cy="0"/>
-        </a:xfrm>
-      </p:grpSpPr>
-      <p:sp>
-        <p:nvSpPr>
-          <p:cNvPr id="2" name="Title 1">
-            <a:extLst>
-              <a:ext uri="{FF2B5EF4-FFF2-40B4-BE49-F238E27FC236}">
-                <a16:creationId xmlns:a16="http://schemas.microsoft.com/office/drawing/2014/main" id="{79B8C30F-E18C-4E2F-A56D-316F8D2F71D9}"/>
-              </a:ext>
-            </a:extLst>
-          </p:cNvPr>
-          <p:cNvSpPr>
-            <a:spLocks noGrp="1"/>
-          </p:cNvSpPr>
-          <p:nvPr>
-            <p:ph type="title"/>
-          </p:nvPr>
-        </p:nvSpPr>
-        <p:spPr/>
-        <p:txBody>
-          <a:bodyPr>
-            <a:normAutofit fontScale="90000"/>
-          </a:bodyPr>
-          <a:lstStyle/>
-          <a:p>
-            <a:r>
-              <a:rPr lang="en-US" dirty="0"/>
-              <a:t>Other plot types</a:t>
-            </a:r>
-          </a:p>
-        </p:txBody>
-      </p:sp>
-      <p:sp>
-        <p:nvSpPr>
-          <p:cNvPr id="3" name="Text Placeholder 2">
-            <a:extLst>
-              <a:ext uri="{FF2B5EF4-FFF2-40B4-BE49-F238E27FC236}">
-                <a16:creationId xmlns:a16="http://schemas.microsoft.com/office/drawing/2014/main" id="{11F5FBF7-F646-4693-B06B-A3639F521F22}"/>
-              </a:ext>
-            </a:extLst>
-          </p:cNvPr>
-          <p:cNvSpPr>
-            <a:spLocks noGrp="1"/>
-          </p:cNvSpPr>
-          <p:nvPr>
-            <p:ph type="body" sz="quarter" idx="10"/>
-          </p:nvPr>
-        </p:nvSpPr>
-        <p:spPr/>
-        <p:txBody>
-          <a:bodyPr>
-            <a:normAutofit/>
-          </a:bodyPr>
-          <a:lstStyle/>
-          <a:p>
-            <a:pPr marL="0" indent="0">
-              <a:buNone/>
-            </a:pPr>
-            <a:r>
-              <a:rPr lang="en-US" sz="3500" b="1" dirty="0">
-                <a:solidFill>
-                  <a:schemeClr val="accent1"/>
-                </a:solidFill>
-                <a:latin typeface="+mn-lt"/>
-              </a:rPr>
-              <a:t>Bar Plot</a:t>
-            </a:r>
-          </a:p>
-          <a:p>
-            <a:pPr marL="0" indent="0">
-              <a:buNone/>
-            </a:pPr>
-            <a:r>
-              <a:rPr lang="en-US" sz="3500" dirty="0" err="1">
-                <a:latin typeface="Consolas" panose="020B0609020204030204" pitchFamily="49" charset="0"/>
-              </a:rPr>
-              <a:t>plt.bar</a:t>
-            </a:r>
-            <a:r>
-              <a:rPr lang="en-US" sz="3500" dirty="0">
-                <a:latin typeface="Consolas" panose="020B0609020204030204" pitchFamily="49" charset="0"/>
-              </a:rPr>
-              <a:t>(</a:t>
-            </a:r>
-            <a:r>
-              <a:rPr lang="en-US" sz="3500" dirty="0" err="1">
-                <a:latin typeface="Consolas" panose="020B0609020204030204" pitchFamily="49" charset="0"/>
-              </a:rPr>
-              <a:t>xs</a:t>
-            </a:r>
-            <a:r>
-              <a:rPr lang="en-US" sz="3500" dirty="0">
-                <a:latin typeface="Consolas" panose="020B0609020204030204" pitchFamily="49" charset="0"/>
-              </a:rPr>
-              <a:t>, </a:t>
-            </a:r>
-            <a:r>
-              <a:rPr lang="en-US" sz="3500" dirty="0" err="1">
-                <a:latin typeface="Consolas" panose="020B0609020204030204" pitchFamily="49" charset="0"/>
-              </a:rPr>
-              <a:t>ys</a:t>
-            </a:r>
-            <a:r>
-              <a:rPr lang="en-US" sz="3500" dirty="0">
-                <a:latin typeface="Consolas" panose="020B0609020204030204" pitchFamily="49" charset="0"/>
-              </a:rPr>
-              <a:t>, width=0.8)</a:t>
-            </a:r>
-          </a:p>
-          <a:p>
-            <a:pPr marL="0" indent="0">
-              <a:buNone/>
-            </a:pPr>
-            <a:endParaRPr lang="en-US" sz="3500" dirty="0">
-              <a:latin typeface="Consolas" panose="020B0609020204030204" pitchFamily="49" charset="0"/>
-            </a:endParaRPr>
-          </a:p>
-          <a:p>
-            <a:pPr marL="0" indent="0">
-              <a:buNone/>
-            </a:pPr>
-            <a:r>
-              <a:rPr lang="en-US" sz="3500" b="1" dirty="0">
-                <a:solidFill>
-                  <a:schemeClr val="accent1"/>
-                </a:solidFill>
-                <a:latin typeface="+mn-lt"/>
-              </a:rPr>
-              <a:t>Histogram Plot</a:t>
-            </a:r>
-          </a:p>
-          <a:p>
-            <a:pPr marL="0" indent="0">
-              <a:buNone/>
-            </a:pPr>
-            <a:r>
-              <a:rPr lang="en-US" sz="3500" dirty="0" err="1">
-                <a:latin typeface="Consolas" panose="020B0609020204030204" pitchFamily="49" charset="0"/>
-              </a:rPr>
-              <a:t>plt.hist</a:t>
-            </a:r>
-            <a:r>
-              <a:rPr lang="en-US" sz="3500" dirty="0">
-                <a:latin typeface="Consolas" panose="020B0609020204030204" pitchFamily="49" charset="0"/>
-              </a:rPr>
-              <a:t>(data,   </a:t>
-            </a:r>
-          </a:p>
-          <a:p>
-            <a:pPr marL="0" indent="0">
-              <a:buNone/>
-            </a:pPr>
-            <a:r>
-              <a:rPr lang="en-US" sz="3500" dirty="0">
-                <a:latin typeface="Consolas" panose="020B0609020204030204" pitchFamily="49" charset="0"/>
-              </a:rPr>
-              <a:t>         bins=</a:t>
-            </a:r>
-            <a:r>
-              <a:rPr lang="en-US" sz="3500" dirty="0" err="1">
-                <a:latin typeface="Consolas" panose="020B0609020204030204" pitchFamily="49" charset="0"/>
-              </a:rPr>
-              <a:t>Nbins_or_list_of_bins</a:t>
-            </a:r>
-            <a:r>
-              <a:rPr lang="en-US" sz="3500" dirty="0">
-                <a:latin typeface="Consolas" panose="020B0609020204030204" pitchFamily="49" charset="0"/>
-              </a:rPr>
-              <a:t>,</a:t>
-            </a:r>
-          </a:p>
-          <a:p>
-            <a:pPr marL="0" indent="0">
-              <a:buNone/>
-            </a:pPr>
-            <a:r>
-              <a:rPr lang="en-US" sz="3500" dirty="0">
-                <a:latin typeface="Consolas" panose="020B0609020204030204" pitchFamily="49" charset="0"/>
-              </a:rPr>
-              <a:t>         </a:t>
-            </a:r>
-            <a:r>
-              <a:rPr lang="en-US" sz="3500" dirty="0" err="1">
-                <a:latin typeface="Consolas" panose="020B0609020204030204" pitchFamily="49" charset="0"/>
-              </a:rPr>
-              <a:t>rwidth</a:t>
-            </a:r>
-            <a:r>
-              <a:rPr lang="en-US" sz="3500" dirty="0">
-                <a:latin typeface="Consolas" panose="020B0609020204030204" pitchFamily="49" charset="0"/>
-              </a:rPr>
-              <a:t>=</a:t>
-            </a:r>
-            <a:r>
-              <a:rPr lang="en-US" sz="3500" dirty="0" err="1">
-                <a:latin typeface="Consolas" panose="020B0609020204030204" pitchFamily="49" charset="0"/>
-              </a:rPr>
-              <a:t>visual_bar_width</a:t>
-            </a:r>
-            <a:r>
-              <a:rPr lang="en-US" sz="3500" dirty="0">
-                <a:latin typeface="Consolas" panose="020B0609020204030204" pitchFamily="49" charset="0"/>
-              </a:rPr>
-              <a:t>,</a:t>
-            </a:r>
-          </a:p>
-          <a:p>
-            <a:pPr marL="0" indent="0">
-              <a:buNone/>
-            </a:pPr>
-            <a:r>
-              <a:rPr lang="en-US" sz="3500" dirty="0">
-                <a:latin typeface="Consolas" panose="020B0609020204030204" pitchFamily="49" charset="0"/>
-              </a:rPr>
-              <a:t>         weights=</a:t>
-            </a:r>
-            <a:r>
-              <a:rPr lang="en-US" sz="3500" dirty="0" err="1">
-                <a:latin typeface="Consolas" panose="020B0609020204030204" pitchFamily="49" charset="0"/>
-              </a:rPr>
-              <a:t>list_of_weights_for_data</a:t>
-            </a:r>
-            <a:r>
-              <a:rPr lang="en-US" sz="3500" dirty="0">
-                <a:latin typeface="Consolas" panose="020B0609020204030204" pitchFamily="49" charset="0"/>
-              </a:rPr>
-              <a:t>)</a:t>
-            </a:r>
-          </a:p>
-          <a:p>
-            <a:pPr marL="0" indent="0">
-              <a:buNone/>
-            </a:pPr>
-            <a:r>
-              <a:rPr lang="en-US" sz="3500" dirty="0">
-                <a:latin typeface="Consolas" panose="020B0609020204030204" pitchFamily="49" charset="0"/>
-              </a:rPr>
-              <a:t> </a:t>
-            </a:r>
-          </a:p>
-        </p:txBody>
-      </p:sp>
-    </p:spTree>
-    <p:extLst>
-      <p:ext uri="{BB962C8B-B14F-4D97-AF65-F5344CB8AC3E}">
-        <p14:creationId xmlns:p14="http://schemas.microsoft.com/office/powerpoint/2010/main" val="371582795"/>
-      </p:ext>
-    </p:extLst>
-  </p:cSld>
-  <p:clrMapOvr>
-    <a:masterClrMapping/>
-  </p:clrMapOvr>
-  <p:transition spd="med"/>
-</p:sld>
-</file>
-
-<file path=ppt/slides/slide33.xml><?xml version="1.0" encoding="utf-8"?>
-<p:sld xmlns:a="http://schemas.openxmlformats.org/drawingml/2006/main" xmlns:r="http://schemas.openxmlformats.org/officeDocument/2006/relationships" xmlns:p="http://schemas.openxmlformats.org/presentationml/2006/main">
-  <p:cSld>
-    <p:spTree>
-      <p:nvGrpSpPr>
-        <p:cNvPr id="1" name=""/>
-        <p:cNvGrpSpPr/>
-        <p:nvPr/>
-      </p:nvGrpSpPr>
-      <p:grpSpPr>
-        <a:xfrm>
-          <a:off x="0" y="0"/>
-          <a:ext cx="0" cy="0"/>
-          <a:chOff x="0" y="0"/>
-          <a:chExt cx="0" cy="0"/>
-        </a:xfrm>
-      </p:grpSpPr>
-      <p:sp>
-        <p:nvSpPr>
-          <p:cNvPr id="2" name="Text Placeholder 1">
-            <a:extLst>
-              <a:ext uri="{FF2B5EF4-FFF2-40B4-BE49-F238E27FC236}">
-                <a16:creationId xmlns:a16="http://schemas.microsoft.com/office/drawing/2014/main" id="{2942E3AC-8FD9-4474-8321-DDCE94F95DEC}"/>
-              </a:ext>
-            </a:extLst>
-          </p:cNvPr>
-          <p:cNvSpPr>
-            <a:spLocks noGrp="1"/>
-          </p:cNvSpPr>
-          <p:nvPr>
-            <p:ph type="body" sz="quarter" idx="10"/>
-          </p:nvPr>
-        </p:nvSpPr>
-        <p:spPr/>
-        <p:txBody>
-          <a:bodyPr/>
-          <a:lstStyle/>
-          <a:p>
-            <a:r>
-              <a:rPr lang="en-US" dirty="0"/>
-              <a:t>Exercises</a:t>
-            </a:r>
-          </a:p>
-        </p:txBody>
-      </p:sp>
-    </p:spTree>
-  </p:cSld>
-  <p:clrMapOvr>
-    <a:masterClrMapping/>
-  </p:clrMapOvr>
-  <p:transition spd="med"/>
-</p:sld>
-</file>
-
-<file path=ppt/slides/slide4.xml><?xml version="1.0" encoding="utf-8"?>
+<file path=ppt/slides/slide3.xml><?xml version="1.0" encoding="utf-8"?>
 <p:sld xmlns:a="http://schemas.openxmlformats.org/drawingml/2006/main" xmlns:r="http://schemas.openxmlformats.org/officeDocument/2006/relationships" xmlns:p="http://schemas.openxmlformats.org/presentationml/2006/main">
   <p:cSld>
     <p:spTree>
@@ -15704,7 +14878,577 @@
 </p:sld>
 </file>
 
-<file path=ppt/slides/slide5.xml><?xml version="1.0" encoding="utf-8"?>
+<file path=ppt/slides/slide30.xml><?xml version="1.0" encoding="utf-8"?>
+<p:sld xmlns:a="http://schemas.openxmlformats.org/drawingml/2006/main" xmlns:r="http://schemas.openxmlformats.org/officeDocument/2006/relationships" xmlns:p="http://schemas.openxmlformats.org/presentationml/2006/main" show="0">
+  <p:cSld>
+    <p:spTree>
+      <p:nvGrpSpPr>
+        <p:cNvPr id="1" name=""/>
+        <p:cNvGrpSpPr/>
+        <p:nvPr/>
+      </p:nvGrpSpPr>
+      <p:grpSpPr>
+        <a:xfrm>
+          <a:off x="0" y="0"/>
+          <a:ext cx="0" cy="0"/>
+          <a:chOff x="0" y="0"/>
+          <a:chExt cx="0" cy="0"/>
+        </a:xfrm>
+      </p:grpSpPr>
+      <p:sp>
+        <p:nvSpPr>
+          <p:cNvPr id="2" name="Title 1">
+            <a:extLst>
+              <a:ext uri="{FF2B5EF4-FFF2-40B4-BE49-F238E27FC236}">
+                <a16:creationId xmlns:a16="http://schemas.microsoft.com/office/drawing/2014/main" id="{3DC766B5-F81C-438A-93E2-C1540F0A0079}"/>
+              </a:ext>
+            </a:extLst>
+          </p:cNvPr>
+          <p:cNvSpPr>
+            <a:spLocks noGrp="1"/>
+          </p:cNvSpPr>
+          <p:nvPr>
+            <p:ph type="title"/>
+          </p:nvPr>
+        </p:nvSpPr>
+        <p:spPr/>
+        <p:txBody>
+          <a:bodyPr>
+            <a:normAutofit fontScale="90000"/>
+          </a:bodyPr>
+          <a:lstStyle/>
+          <a:p>
+            <a:r>
+              <a:rPr lang="en-US" dirty="0"/>
+              <a:t>Example: 5-to-1</a:t>
+            </a:r>
+          </a:p>
+        </p:txBody>
+      </p:sp>
+      <p:sp>
+        <p:nvSpPr>
+          <p:cNvPr id="3" name="Text Placeholder 2">
+            <a:extLst>
+              <a:ext uri="{FF2B5EF4-FFF2-40B4-BE49-F238E27FC236}">
+                <a16:creationId xmlns:a16="http://schemas.microsoft.com/office/drawing/2014/main" id="{6AE86592-18EB-4A5A-86D7-92D6EB9F0C4C}"/>
+              </a:ext>
+            </a:extLst>
+          </p:cNvPr>
+          <p:cNvSpPr>
+            <a:spLocks noGrp="1"/>
+          </p:cNvSpPr>
+          <p:nvPr>
+            <p:ph type="body" sz="quarter" idx="10"/>
+          </p:nvPr>
+        </p:nvSpPr>
+        <p:spPr/>
+        <p:txBody>
+          <a:bodyPr/>
+          <a:lstStyle/>
+          <a:p>
+            <a:pPr marL="0" indent="0">
+              <a:buNone/>
+            </a:pPr>
+            <a:r>
+              <a:rPr lang="en-US" dirty="0">
+                <a:latin typeface="Consolas" panose="020B0609020204030204" pitchFamily="49" charset="0"/>
+              </a:rPr>
+              <a:t>fig = </a:t>
+            </a:r>
+            <a:r>
+              <a:rPr lang="en-US" dirty="0" err="1">
+                <a:latin typeface="Consolas" panose="020B0609020204030204" pitchFamily="49" charset="0"/>
+              </a:rPr>
+              <a:t>plt.figure</a:t>
+            </a:r>
+            <a:r>
+              <a:rPr lang="en-US" dirty="0">
+                <a:latin typeface="Consolas" panose="020B0609020204030204" pitchFamily="49" charset="0"/>
+              </a:rPr>
+              <a:t>()</a:t>
+            </a:r>
+          </a:p>
+          <a:p>
+            <a:pPr marL="0" indent="0">
+              <a:buNone/>
+            </a:pPr>
+            <a:r>
+              <a:rPr lang="en-US" dirty="0" err="1">
+                <a:latin typeface="Consolas" panose="020B0609020204030204" pitchFamily="49" charset="0"/>
+              </a:rPr>
+              <a:t>gs</a:t>
+            </a:r>
+            <a:r>
+              <a:rPr lang="en-US" dirty="0">
+                <a:latin typeface="Consolas" panose="020B0609020204030204" pitchFamily="49" charset="0"/>
+              </a:rPr>
+              <a:t> = </a:t>
+            </a:r>
+            <a:r>
+              <a:rPr lang="en-US" dirty="0" err="1">
+                <a:latin typeface="Consolas" panose="020B0609020204030204" pitchFamily="49" charset="0"/>
+              </a:rPr>
+              <a:t>fig.add_gridspec</a:t>
+            </a:r>
+            <a:r>
+              <a:rPr lang="en-US" dirty="0">
+                <a:latin typeface="Consolas" panose="020B0609020204030204" pitchFamily="49" charset="0"/>
+              </a:rPr>
+              <a:t>(6, 1)</a:t>
+            </a:r>
+          </a:p>
+          <a:p>
+            <a:pPr marL="0" indent="0">
+              <a:buNone/>
+            </a:pPr>
+            <a:r>
+              <a:rPr lang="en-US" dirty="0">
+                <a:latin typeface="Consolas" panose="020B0609020204030204" pitchFamily="49" charset="0"/>
+              </a:rPr>
+              <a:t>ax1 = </a:t>
+            </a:r>
+            <a:r>
+              <a:rPr lang="en-US" dirty="0" err="1">
+                <a:latin typeface="Consolas" panose="020B0609020204030204" pitchFamily="49" charset="0"/>
+              </a:rPr>
+              <a:t>fig.add_subplot</a:t>
+            </a:r>
+            <a:r>
+              <a:rPr lang="en-US" dirty="0">
+                <a:latin typeface="Consolas" panose="020B0609020204030204" pitchFamily="49" charset="0"/>
+              </a:rPr>
+              <a:t>(</a:t>
+            </a:r>
+            <a:r>
+              <a:rPr lang="en-US" dirty="0" err="1">
+                <a:latin typeface="Consolas" panose="020B0609020204030204" pitchFamily="49" charset="0"/>
+              </a:rPr>
+              <a:t>gs</a:t>
+            </a:r>
+            <a:r>
+              <a:rPr lang="en-US" dirty="0">
+                <a:latin typeface="Consolas" panose="020B0609020204030204" pitchFamily="49" charset="0"/>
+              </a:rPr>
+              <a:t>[0:6, 1])</a:t>
+            </a:r>
+          </a:p>
+          <a:p>
+            <a:pPr marL="0" indent="0">
+              <a:buNone/>
+            </a:pPr>
+            <a:r>
+              <a:rPr lang="en-US" dirty="0">
+                <a:latin typeface="Consolas" panose="020B0609020204030204" pitchFamily="49" charset="0"/>
+              </a:rPr>
+              <a:t>ax1.plot(xs1, ys1)</a:t>
+            </a:r>
+          </a:p>
+          <a:p>
+            <a:pPr marL="0" indent="0">
+              <a:buNone/>
+            </a:pPr>
+            <a:r>
+              <a:rPr lang="en-US" dirty="0">
+                <a:latin typeface="Consolas" panose="020B0609020204030204" pitchFamily="49" charset="0"/>
+              </a:rPr>
+              <a:t>ax2 = </a:t>
+            </a:r>
+            <a:r>
+              <a:rPr lang="en-US" dirty="0" err="1">
+                <a:latin typeface="Consolas" panose="020B0609020204030204" pitchFamily="49" charset="0"/>
+              </a:rPr>
+              <a:t>fig.add_subplot</a:t>
+            </a:r>
+            <a:r>
+              <a:rPr lang="en-US" dirty="0">
+                <a:latin typeface="Consolas" panose="020B0609020204030204" pitchFamily="49" charset="0"/>
+              </a:rPr>
+              <a:t>(</a:t>
+            </a:r>
+            <a:r>
+              <a:rPr lang="en-US" dirty="0" err="1">
+                <a:latin typeface="Consolas" panose="020B0609020204030204" pitchFamily="49" charset="0"/>
+              </a:rPr>
+              <a:t>gs</a:t>
+            </a:r>
+            <a:r>
+              <a:rPr lang="en-US" dirty="0">
+                <a:latin typeface="Consolas" panose="020B0609020204030204" pitchFamily="49" charset="0"/>
+              </a:rPr>
+              <a:t>[6, 1])</a:t>
+            </a:r>
+          </a:p>
+          <a:p>
+            <a:pPr marL="0" indent="0">
+              <a:buNone/>
+            </a:pPr>
+            <a:r>
+              <a:rPr lang="en-US" dirty="0">
+                <a:latin typeface="Consolas" panose="020B0609020204030204" pitchFamily="49" charset="0"/>
+              </a:rPr>
+              <a:t>ax2.plot(xs2, ys2)</a:t>
+            </a:r>
+          </a:p>
+          <a:p>
+            <a:pPr marL="0" indent="0">
+              <a:buNone/>
+            </a:pPr>
+            <a:r>
+              <a:rPr lang="en-US" dirty="0" err="1">
+                <a:latin typeface="Consolas" panose="020B0609020204030204" pitchFamily="49" charset="0"/>
+              </a:rPr>
+              <a:t>plt.show</a:t>
+            </a:r>
+            <a:r>
+              <a:rPr lang="en-US" dirty="0">
+                <a:latin typeface="Consolas" panose="020B0609020204030204" pitchFamily="49" charset="0"/>
+              </a:rPr>
+              <a:t>()</a:t>
+            </a:r>
+            <a:endParaRPr lang="en-US" dirty="0"/>
+          </a:p>
+        </p:txBody>
+      </p:sp>
+    </p:spTree>
+    <p:extLst>
+      <p:ext uri="{BB962C8B-B14F-4D97-AF65-F5344CB8AC3E}">
+        <p14:creationId xmlns:p14="http://schemas.microsoft.com/office/powerpoint/2010/main" val="180084786"/>
+      </p:ext>
+    </p:extLst>
+  </p:cSld>
+  <p:clrMapOvr>
+    <a:masterClrMapping/>
+  </p:clrMapOvr>
+  <p:transition spd="med"/>
+</p:sld>
+</file>
+
+<file path=ppt/slides/slide31.xml><?xml version="1.0" encoding="utf-8"?>
+<p:sld xmlns:a="http://schemas.openxmlformats.org/drawingml/2006/main" xmlns:r="http://schemas.openxmlformats.org/officeDocument/2006/relationships" xmlns:p="http://schemas.openxmlformats.org/presentationml/2006/main">
+  <p:cSld>
+    <p:spTree>
+      <p:nvGrpSpPr>
+        <p:cNvPr id="1" name=""/>
+        <p:cNvGrpSpPr/>
+        <p:nvPr/>
+      </p:nvGrpSpPr>
+      <p:grpSpPr>
+        <a:xfrm>
+          <a:off x="0" y="0"/>
+          <a:ext cx="0" cy="0"/>
+          <a:chOff x="0" y="0"/>
+          <a:chExt cx="0" cy="0"/>
+        </a:xfrm>
+      </p:grpSpPr>
+      <p:sp>
+        <p:nvSpPr>
+          <p:cNvPr id="2" name="Title 1">
+            <a:extLst>
+              <a:ext uri="{FF2B5EF4-FFF2-40B4-BE49-F238E27FC236}">
+                <a16:creationId xmlns:a16="http://schemas.microsoft.com/office/drawing/2014/main" id="{79B8C30F-E18C-4E2F-A56D-316F8D2F71D9}"/>
+              </a:ext>
+            </a:extLst>
+          </p:cNvPr>
+          <p:cNvSpPr>
+            <a:spLocks noGrp="1"/>
+          </p:cNvSpPr>
+          <p:nvPr>
+            <p:ph type="title"/>
+          </p:nvPr>
+        </p:nvSpPr>
+        <p:spPr/>
+        <p:txBody>
+          <a:bodyPr>
+            <a:normAutofit fontScale="90000"/>
+          </a:bodyPr>
+          <a:lstStyle/>
+          <a:p>
+            <a:r>
+              <a:rPr lang="en-US" dirty="0"/>
+              <a:t>Other plot types</a:t>
+            </a:r>
+          </a:p>
+        </p:txBody>
+      </p:sp>
+      <p:sp>
+        <p:nvSpPr>
+          <p:cNvPr id="3" name="Text Placeholder 2">
+            <a:extLst>
+              <a:ext uri="{FF2B5EF4-FFF2-40B4-BE49-F238E27FC236}">
+                <a16:creationId xmlns:a16="http://schemas.microsoft.com/office/drawing/2014/main" id="{11F5FBF7-F646-4693-B06B-A3639F521F22}"/>
+              </a:ext>
+            </a:extLst>
+          </p:cNvPr>
+          <p:cNvSpPr>
+            <a:spLocks noGrp="1"/>
+          </p:cNvSpPr>
+          <p:nvPr>
+            <p:ph type="body" sz="quarter" idx="10"/>
+          </p:nvPr>
+        </p:nvSpPr>
+        <p:spPr/>
+        <p:txBody>
+          <a:bodyPr>
+            <a:normAutofit/>
+          </a:bodyPr>
+          <a:lstStyle/>
+          <a:p>
+            <a:pPr marL="0" indent="0">
+              <a:buNone/>
+            </a:pPr>
+            <a:r>
+              <a:rPr lang="en-US" sz="3500" b="1" dirty="0">
+                <a:solidFill>
+                  <a:schemeClr val="accent1"/>
+                </a:solidFill>
+                <a:latin typeface="+mn-lt"/>
+              </a:rPr>
+              <a:t>Bar Plot</a:t>
+            </a:r>
+          </a:p>
+          <a:p>
+            <a:pPr marL="0" indent="0">
+              <a:buNone/>
+            </a:pPr>
+            <a:r>
+              <a:rPr lang="en-US" sz="3500" dirty="0" err="1">
+                <a:latin typeface="Consolas" panose="020B0609020204030204" pitchFamily="49" charset="0"/>
+              </a:rPr>
+              <a:t>plt.bar</a:t>
+            </a:r>
+            <a:r>
+              <a:rPr lang="en-US" sz="3500" dirty="0">
+                <a:latin typeface="Consolas" panose="020B0609020204030204" pitchFamily="49" charset="0"/>
+              </a:rPr>
+              <a:t>(</a:t>
+            </a:r>
+            <a:r>
+              <a:rPr lang="en-US" sz="3500" dirty="0" err="1">
+                <a:latin typeface="Consolas" panose="020B0609020204030204" pitchFamily="49" charset="0"/>
+              </a:rPr>
+              <a:t>xs</a:t>
+            </a:r>
+            <a:r>
+              <a:rPr lang="en-US" sz="3500" dirty="0">
+                <a:latin typeface="Consolas" panose="020B0609020204030204" pitchFamily="49" charset="0"/>
+              </a:rPr>
+              <a:t>, </a:t>
+            </a:r>
+            <a:r>
+              <a:rPr lang="en-US" sz="3500" dirty="0" err="1">
+                <a:latin typeface="Consolas" panose="020B0609020204030204" pitchFamily="49" charset="0"/>
+              </a:rPr>
+              <a:t>ys</a:t>
+            </a:r>
+            <a:r>
+              <a:rPr lang="en-US" sz="3500" dirty="0">
+                <a:latin typeface="Consolas" panose="020B0609020204030204" pitchFamily="49" charset="0"/>
+              </a:rPr>
+              <a:t>, width=0.8)</a:t>
+            </a:r>
+          </a:p>
+          <a:p>
+            <a:pPr marL="0" indent="0">
+              <a:buNone/>
+            </a:pPr>
+            <a:endParaRPr lang="en-US" sz="3500" dirty="0">
+              <a:latin typeface="Consolas" panose="020B0609020204030204" pitchFamily="49" charset="0"/>
+            </a:endParaRPr>
+          </a:p>
+          <a:p>
+            <a:pPr marL="0" indent="0">
+              <a:buNone/>
+            </a:pPr>
+            <a:r>
+              <a:rPr lang="en-US" sz="3500" b="1" dirty="0">
+                <a:solidFill>
+                  <a:schemeClr val="accent1"/>
+                </a:solidFill>
+                <a:latin typeface="+mn-lt"/>
+              </a:rPr>
+              <a:t>Histogram Plot</a:t>
+            </a:r>
+          </a:p>
+          <a:p>
+            <a:pPr marL="0" indent="0">
+              <a:buNone/>
+            </a:pPr>
+            <a:r>
+              <a:rPr lang="en-US" sz="3500" dirty="0" err="1">
+                <a:latin typeface="Consolas" panose="020B0609020204030204" pitchFamily="49" charset="0"/>
+              </a:rPr>
+              <a:t>plt.hist</a:t>
+            </a:r>
+            <a:r>
+              <a:rPr lang="en-US" sz="3500" dirty="0">
+                <a:latin typeface="Consolas" panose="020B0609020204030204" pitchFamily="49" charset="0"/>
+              </a:rPr>
+              <a:t>(data,   </a:t>
+            </a:r>
+          </a:p>
+          <a:p>
+            <a:pPr marL="0" indent="0">
+              <a:buNone/>
+            </a:pPr>
+            <a:r>
+              <a:rPr lang="en-US" sz="3500" dirty="0">
+                <a:latin typeface="Consolas" panose="020B0609020204030204" pitchFamily="49" charset="0"/>
+              </a:rPr>
+              <a:t>         bins=</a:t>
+            </a:r>
+            <a:r>
+              <a:rPr lang="en-US" sz="3500" dirty="0" err="1">
+                <a:latin typeface="Consolas" panose="020B0609020204030204" pitchFamily="49" charset="0"/>
+              </a:rPr>
+              <a:t>Nbins_or_list_of_bins</a:t>
+            </a:r>
+            <a:r>
+              <a:rPr lang="en-US" sz="3500" dirty="0">
+                <a:latin typeface="Consolas" panose="020B0609020204030204" pitchFamily="49" charset="0"/>
+              </a:rPr>
+              <a:t>,</a:t>
+            </a:r>
+          </a:p>
+          <a:p>
+            <a:pPr marL="0" indent="0">
+              <a:buNone/>
+            </a:pPr>
+            <a:r>
+              <a:rPr lang="en-US" sz="3500" dirty="0">
+                <a:latin typeface="Consolas" panose="020B0609020204030204" pitchFamily="49" charset="0"/>
+              </a:rPr>
+              <a:t>         </a:t>
+            </a:r>
+            <a:r>
+              <a:rPr lang="en-US" sz="3500" dirty="0" err="1">
+                <a:latin typeface="Consolas" panose="020B0609020204030204" pitchFamily="49" charset="0"/>
+              </a:rPr>
+              <a:t>rwidth</a:t>
+            </a:r>
+            <a:r>
+              <a:rPr lang="en-US" sz="3500" dirty="0">
+                <a:latin typeface="Consolas" panose="020B0609020204030204" pitchFamily="49" charset="0"/>
+              </a:rPr>
+              <a:t>=</a:t>
+            </a:r>
+            <a:r>
+              <a:rPr lang="en-US" sz="3500" dirty="0" err="1">
+                <a:latin typeface="Consolas" panose="020B0609020204030204" pitchFamily="49" charset="0"/>
+              </a:rPr>
+              <a:t>visual_bar_width</a:t>
+            </a:r>
+            <a:r>
+              <a:rPr lang="en-US" sz="3500" dirty="0">
+                <a:latin typeface="Consolas" panose="020B0609020204030204" pitchFamily="49" charset="0"/>
+              </a:rPr>
+              <a:t>,</a:t>
+            </a:r>
+          </a:p>
+          <a:p>
+            <a:pPr marL="0" indent="0">
+              <a:buNone/>
+            </a:pPr>
+            <a:r>
+              <a:rPr lang="en-US" sz="3500" dirty="0">
+                <a:latin typeface="Consolas" panose="020B0609020204030204" pitchFamily="49" charset="0"/>
+              </a:rPr>
+              <a:t>         weights=</a:t>
+            </a:r>
+            <a:r>
+              <a:rPr lang="en-US" sz="3500" dirty="0" err="1">
+                <a:latin typeface="Consolas" panose="020B0609020204030204" pitchFamily="49" charset="0"/>
+              </a:rPr>
+              <a:t>list_of_weights_for_data</a:t>
+            </a:r>
+            <a:r>
+              <a:rPr lang="en-US" sz="3500" dirty="0">
+                <a:latin typeface="Consolas" panose="020B0609020204030204" pitchFamily="49" charset="0"/>
+              </a:rPr>
+              <a:t>)</a:t>
+            </a:r>
+          </a:p>
+          <a:p>
+            <a:pPr marL="0" indent="0">
+              <a:buNone/>
+            </a:pPr>
+            <a:r>
+              <a:rPr lang="en-US" sz="3500" dirty="0">
+                <a:latin typeface="Consolas" panose="020B0609020204030204" pitchFamily="49" charset="0"/>
+              </a:rPr>
+              <a:t> </a:t>
+            </a:r>
+          </a:p>
+        </p:txBody>
+      </p:sp>
+    </p:spTree>
+    <p:extLst>
+      <p:ext uri="{BB962C8B-B14F-4D97-AF65-F5344CB8AC3E}">
+        <p14:creationId xmlns:p14="http://schemas.microsoft.com/office/powerpoint/2010/main" val="371582795"/>
+      </p:ext>
+    </p:extLst>
+  </p:cSld>
+  <p:clrMapOvr>
+    <a:masterClrMapping/>
+  </p:clrMapOvr>
+  <p:transition spd="med"/>
+</p:sld>
+</file>
+
+<file path=ppt/slides/slide32.xml><?xml version="1.0" encoding="utf-8"?>
+<p:sld xmlns:a="http://schemas.openxmlformats.org/drawingml/2006/main" xmlns:r="http://schemas.openxmlformats.org/officeDocument/2006/relationships" xmlns:p="http://schemas.openxmlformats.org/presentationml/2006/main">
+  <p:cSld>
+    <p:spTree>
+      <p:nvGrpSpPr>
+        <p:cNvPr id="1" name=""/>
+        <p:cNvGrpSpPr/>
+        <p:nvPr/>
+      </p:nvGrpSpPr>
+      <p:grpSpPr>
+        <a:xfrm>
+          <a:off x="0" y="0"/>
+          <a:ext cx="0" cy="0"/>
+          <a:chOff x="0" y="0"/>
+          <a:chExt cx="0" cy="0"/>
+        </a:xfrm>
+      </p:grpSpPr>
+      <p:sp>
+        <p:nvSpPr>
+          <p:cNvPr id="2" name="Text Placeholder 1">
+            <a:extLst>
+              <a:ext uri="{FF2B5EF4-FFF2-40B4-BE49-F238E27FC236}">
+                <a16:creationId xmlns:a16="http://schemas.microsoft.com/office/drawing/2014/main" id="{2942E3AC-8FD9-4474-8321-DDCE94F95DEC}"/>
+              </a:ext>
+            </a:extLst>
+          </p:cNvPr>
+          <p:cNvSpPr>
+            <a:spLocks noGrp="1"/>
+          </p:cNvSpPr>
+          <p:nvPr>
+            <p:ph type="body" sz="quarter" idx="10"/>
+          </p:nvPr>
+        </p:nvSpPr>
+        <p:spPr/>
+        <p:txBody>
+          <a:bodyPr/>
+          <a:lstStyle/>
+          <a:p>
+            <a:r>
+              <a:rPr lang="en-US" dirty="0"/>
+              <a:t>Exercises</a:t>
+            </a:r>
+          </a:p>
+        </p:txBody>
+      </p:sp>
+    </p:spTree>
+  </p:cSld>
+  <p:clrMapOvr>
+    <a:masterClrMapping/>
+  </p:clrMapOvr>
+  <p:transition spd="med"/>
+</p:sld>
+</file>
+
+<file path=ppt/slides/slide4.xml><?xml version="1.0" encoding="utf-8"?>
 <p:sld xmlns:a="http://schemas.openxmlformats.org/drawingml/2006/main" xmlns:r="http://schemas.openxmlformats.org/officeDocument/2006/relationships" xmlns:p="http://schemas.openxmlformats.org/presentationml/2006/main">
   <p:cSld>
     <p:spTree>
@@ -15765,8 +15509,8 @@
         </p:nvSpPr>
         <p:spPr>
           <a:xfrm>
-            <a:off x="763759" y="4925950"/>
-            <a:ext cx="4967338" cy="1168401"/>
+            <a:off x="763759" y="4920246"/>
+            <a:ext cx="4954883" cy="1179810"/>
           </a:xfrm>
           <a:prstGeom prst="rect">
             <a:avLst/>
@@ -15776,7 +15520,7 @@
           </a:ln>
           <a:extLst>
             <a:ext uri="{C572A759-6A51-4108-AA02-DFA0A04FC94B}">
-              <ma14:wrappingTextBoxFlag xmlns:ma14="http://schemas.microsoft.com/office/mac/drawingml/2011/main" xmlns="" val="1"/>
+              <ma14:wrappingTextBoxFlag xmlns="" xmlns:ma14="http://schemas.microsoft.com/office/mac/drawingml/2011/main" val="1"/>
             </a:ext>
           </a:extLst>
         </p:spPr>
@@ -15796,7 +15540,16 @@
           </a:lstStyle>
           <a:p>
             <a:r>
-              <a:t>df[‘2017’]</a:t>
+              <a:rPr dirty="0" err="1"/>
+              <a:t>df</a:t>
+            </a:r>
+            <a:r>
+              <a:rPr lang="en-US" dirty="0" err="1"/>
+              <a:t>.loc</a:t>
+            </a:r>
+            <a:r>
+              <a:rPr dirty="0"/>
+              <a:t>[‘2017’]</a:t>
             </a:r>
           </a:p>
         </p:txBody>
@@ -15810,7 +15563,7 @@
 </p:sld>
 </file>
 
-<file path=ppt/slides/slide6.xml><?xml version="1.0" encoding="utf-8"?>
+<file path=ppt/slides/slide5.xml><?xml version="1.0" encoding="utf-8"?>
 <p:sld xmlns:a="http://schemas.openxmlformats.org/drawingml/2006/main" xmlns:r="http://schemas.openxmlformats.org/officeDocument/2006/relationships" xmlns:p="http://schemas.openxmlformats.org/presentationml/2006/main">
   <p:cSld>
     <p:spTree>
@@ -15871,8 +15624,8 @@
         </p:nvSpPr>
         <p:spPr>
           <a:xfrm>
-            <a:off x="763759" y="4925950"/>
-            <a:ext cx="6423249" cy="1168401"/>
+            <a:off x="763759" y="4920246"/>
+            <a:ext cx="6139501" cy="1179810"/>
           </a:xfrm>
           <a:prstGeom prst="rect">
             <a:avLst/>
@@ -15882,7 +15635,7 @@
           </a:ln>
           <a:extLst>
             <a:ext uri="{C572A759-6A51-4108-AA02-DFA0A04FC94B}">
-              <ma14:wrappingTextBoxFlag xmlns:ma14="http://schemas.microsoft.com/office/mac/drawingml/2011/main" xmlns="" val="1"/>
+              <ma14:wrappingTextBoxFlag xmlns="" xmlns:ma14="http://schemas.microsoft.com/office/mac/drawingml/2011/main" val="1"/>
             </a:ext>
           </a:extLst>
         </p:spPr>
@@ -15902,7 +15655,16 @@
           </a:lstStyle>
           <a:p>
             <a:r>
-              <a:t>df[‘2017-02’]</a:t>
+              <a:rPr dirty="0" err="1"/>
+              <a:t>df</a:t>
+            </a:r>
+            <a:r>
+              <a:rPr lang="en-US" dirty="0" err="1"/>
+              <a:t>.loc</a:t>
+            </a:r>
+            <a:r>
+              <a:rPr dirty="0"/>
+              <a:t>[‘2017-02’]</a:t>
             </a:r>
           </a:p>
         </p:txBody>
@@ -15916,7 +15678,7 @@
 </p:sld>
 </file>
 
-<file path=ppt/slides/slide7.xml><?xml version="1.0" encoding="utf-8"?>
+<file path=ppt/slides/slide6.xml><?xml version="1.0" encoding="utf-8"?>
 <p:sld xmlns:a="http://schemas.openxmlformats.org/drawingml/2006/main" xmlns:r="http://schemas.openxmlformats.org/officeDocument/2006/relationships" xmlns:p="http://schemas.openxmlformats.org/presentationml/2006/main">
   <p:cSld>
     <p:spTree>
@@ -15977,8 +15739,8 @@
         </p:nvSpPr>
         <p:spPr>
           <a:xfrm>
-            <a:off x="763759" y="4925950"/>
-            <a:ext cx="7879160" cy="1168401"/>
+            <a:off x="763759" y="4920246"/>
+            <a:ext cx="7324121" cy="1179810"/>
           </a:xfrm>
           <a:prstGeom prst="rect">
             <a:avLst/>
@@ -15988,7 +15750,7 @@
           </a:ln>
           <a:extLst>
             <a:ext uri="{C572A759-6A51-4108-AA02-DFA0A04FC94B}">
-              <ma14:wrappingTextBoxFlag xmlns:ma14="http://schemas.microsoft.com/office/mac/drawingml/2011/main" xmlns="" val="1"/>
+              <ma14:wrappingTextBoxFlag xmlns="" xmlns:ma14="http://schemas.microsoft.com/office/mac/drawingml/2011/main" val="1"/>
             </a:ext>
           </a:extLst>
         </p:spPr>
@@ -16008,7 +15770,16 @@
           </a:lstStyle>
           <a:p>
             <a:r>
-              <a:t>df[‘2017-02-01’]</a:t>
+              <a:rPr dirty="0" err="1"/>
+              <a:t>df</a:t>
+            </a:r>
+            <a:r>
+              <a:rPr lang="en-US" dirty="0" err="1"/>
+              <a:t>.loc</a:t>
+            </a:r>
+            <a:r>
+              <a:rPr dirty="0"/>
+              <a:t>[‘2017-02-01’]</a:t>
             </a:r>
           </a:p>
         </p:txBody>
@@ -16022,7 +15793,7 @@
 </p:sld>
 </file>
 
-<file path=ppt/slides/slide8.xml><?xml version="1.0" encoding="utf-8"?>
+<file path=ppt/slides/slide7.xml><?xml version="1.0" encoding="utf-8"?>
 <p:sld xmlns:a="http://schemas.openxmlformats.org/drawingml/2006/main" xmlns:r="http://schemas.openxmlformats.org/officeDocument/2006/relationships" xmlns:p="http://schemas.openxmlformats.org/presentationml/2006/main">
   <p:cSld>
     <p:spTree>
@@ -16094,7 +15865,7 @@
           </a:ln>
           <a:extLst>
             <a:ext uri="{C572A759-6A51-4108-AA02-DFA0A04FC94B}">
-              <ma14:wrappingTextBoxFlag xmlns:ma14="http://schemas.microsoft.com/office/mac/drawingml/2011/main" xmlns="" val="1"/>
+              <ma14:wrappingTextBoxFlag xmlns="" xmlns:ma14="http://schemas.microsoft.com/office/mac/drawingml/2011/main" val="1"/>
             </a:ext>
           </a:extLst>
         </p:spPr>
@@ -16128,7 +15899,7 @@
 </p:sld>
 </file>
 
-<file path=ppt/slides/slide9.xml><?xml version="1.0" encoding="utf-8"?>
+<file path=ppt/slides/slide8.xml><?xml version="1.0" encoding="utf-8"?>
 <p:sld xmlns:a="http://schemas.openxmlformats.org/drawingml/2006/main" xmlns:r="http://schemas.openxmlformats.org/officeDocument/2006/relationships" xmlns:p="http://schemas.openxmlformats.org/presentationml/2006/main">
   <p:cSld>
     <p:spTree>
@@ -16235,6 +16006,112 @@
             </a:pPr>
             <a:r>
               <a:t>Gives max, min, var, std, etc</a:t>
+            </a:r>
+          </a:p>
+        </p:txBody>
+      </p:sp>
+    </p:spTree>
+  </p:cSld>
+  <p:clrMapOvr>
+    <a:masterClrMapping/>
+  </p:clrMapOvr>
+  <p:transition spd="med"/>
+</p:sld>
+</file>
+
+<file path=ppt/slides/slide9.xml><?xml version="1.0" encoding="utf-8"?>
+<p:sld xmlns:a="http://schemas.openxmlformats.org/drawingml/2006/main" xmlns:r="http://schemas.openxmlformats.org/officeDocument/2006/relationships" xmlns:p="http://schemas.openxmlformats.org/presentationml/2006/main">
+  <p:cSld>
+    <p:spTree>
+      <p:nvGrpSpPr>
+        <p:cNvPr id="1" name=""/>
+        <p:cNvGrpSpPr/>
+        <p:nvPr/>
+      </p:nvGrpSpPr>
+      <p:grpSpPr>
+        <a:xfrm>
+          <a:off x="0" y="0"/>
+          <a:ext cx="0" cy="0"/>
+          <a:chOff x="0" y="0"/>
+          <a:chExt cx="0" cy="0"/>
+        </a:xfrm>
+      </p:grpSpPr>
+      <p:sp>
+        <p:nvSpPr>
+          <p:cNvPr id="281" name="Shape 281"/>
+          <p:cNvSpPr>
+            <a:spLocks noGrp="1"/>
+          </p:cNvSpPr>
+          <p:nvPr>
+            <p:ph type="title"/>
+          </p:nvPr>
+        </p:nvSpPr>
+        <p:spPr>
+          <a:xfrm>
+            <a:off x="406400" y="1536700"/>
+            <a:ext cx="12192000" cy="1169260"/>
+          </a:xfrm>
+          <a:prstGeom prst="rect">
+            <a:avLst/>
+          </a:prstGeom>
+        </p:spPr>
+        <p:txBody>
+          <a:bodyPr/>
+          <a:lstStyle>
+            <a:lvl1pPr defTabSz="403097">
+              <a:spcBef>
+                <a:spcPts val="1900"/>
+              </a:spcBef>
+              <a:defRPr sz="8280"/>
+            </a:lvl1pPr>
+          </a:lstStyle>
+          <a:p>
+            <a:r>
+              <a:t>Correlation</a:t>
+            </a:r>
+          </a:p>
+        </p:txBody>
+      </p:sp>
+      <p:sp>
+        <p:nvSpPr>
+          <p:cNvPr id="282" name="Shape 282"/>
+          <p:cNvSpPr/>
+          <p:nvPr/>
+        </p:nvSpPr>
+        <p:spPr>
+          <a:xfrm>
+            <a:off x="763759" y="4925950"/>
+            <a:ext cx="4482034" cy="1168401"/>
+          </a:xfrm>
+          <a:prstGeom prst="rect">
+            <a:avLst/>
+          </a:prstGeom>
+          <a:ln w="12700">
+            <a:miter lim="400000"/>
+          </a:ln>
+          <a:extLst>
+            <a:ext uri="{C572A759-6A51-4108-AA02-DFA0A04FC94B}">
+              <ma14:wrappingTextBoxFlag xmlns="" xmlns:ma14="http://schemas.microsoft.com/office/mac/drawingml/2011/main" val="1"/>
+            </a:ext>
+          </a:extLst>
+        </p:spPr>
+        <p:txBody>
+          <a:bodyPr wrap="none" lIns="50800" tIns="50800" rIns="50800" bIns="50800" anchor="ctr">
+            <a:spAutoFit/>
+          </a:bodyPr>
+          <a:lstStyle>
+            <a:lvl1pPr>
+              <a:defRPr sz="7000">
+                <a:latin typeface="Anonymous Pro for Powerline"/>
+                <a:ea typeface="Anonymous Pro for Powerline"/>
+                <a:cs typeface="Anonymous Pro for Powerline"/>
+                <a:sym typeface="Anonymous Pro for Powerline"/>
+              </a:defRPr>
+            </a:lvl1pPr>
+          </a:lstStyle>
+          <a:p>
+            <a:r>
+              <a:t>df.corr()</a:t>
             </a:r>
           </a:p>
         </p:txBody>

</xml_diff>